<commit_message>
updated day 3 mod 7
added objectives
</commit_message>
<xml_diff>
--- a/Day_03/day3_mod7.pptx
+++ b/Day_03/day3_mod7.pptx
@@ -5,26 +5,27 @@
     <p:sldMasterId id="2147483662" r:id="rId1"/>
   </p:sldMasterIdLst>
   <p:notesMasterIdLst>
-    <p:notesMasterId r:id="rId19"/>
+    <p:notesMasterId r:id="rId20"/>
   </p:notesMasterIdLst>
   <p:sldIdLst>
     <p:sldId id="366" r:id="rId2"/>
     <p:sldId id="258" r:id="rId3"/>
-    <p:sldId id="267" r:id="rId4"/>
-    <p:sldId id="257" r:id="rId5"/>
-    <p:sldId id="268" r:id="rId6"/>
-    <p:sldId id="269" r:id="rId7"/>
-    <p:sldId id="270" r:id="rId8"/>
-    <p:sldId id="271" r:id="rId9"/>
-    <p:sldId id="260" r:id="rId10"/>
-    <p:sldId id="261" r:id="rId11"/>
-    <p:sldId id="273" r:id="rId12"/>
-    <p:sldId id="274" r:id="rId13"/>
-    <p:sldId id="262" r:id="rId14"/>
-    <p:sldId id="275" r:id="rId15"/>
-    <p:sldId id="276" r:id="rId16"/>
-    <p:sldId id="304" r:id="rId17"/>
-    <p:sldId id="263" r:id="rId18"/>
+    <p:sldId id="399" r:id="rId4"/>
+    <p:sldId id="267" r:id="rId5"/>
+    <p:sldId id="257" r:id="rId6"/>
+    <p:sldId id="268" r:id="rId7"/>
+    <p:sldId id="269" r:id="rId8"/>
+    <p:sldId id="270" r:id="rId9"/>
+    <p:sldId id="271" r:id="rId10"/>
+    <p:sldId id="260" r:id="rId11"/>
+    <p:sldId id="261" r:id="rId12"/>
+    <p:sldId id="273" r:id="rId13"/>
+    <p:sldId id="274" r:id="rId14"/>
+    <p:sldId id="262" r:id="rId15"/>
+    <p:sldId id="275" r:id="rId16"/>
+    <p:sldId id="276" r:id="rId17"/>
+    <p:sldId id="304" r:id="rId18"/>
+    <p:sldId id="263" r:id="rId19"/>
   </p:sldIdLst>
   <p:sldSz cx="12192000" cy="6858000"/>
   <p:notesSz cx="6858000" cy="9144000"/>
@@ -213,7 +214,7 @@
           <a:p>
             <a:fld id="{29868737-3E29-4944-B75E-30BDD493E00B}" type="datetimeFigureOut">
               <a:rPr lang="en-US"/>
-              <a:t>6/23/20</a:t>
+              <a:t>7/17/20</a:t>
             </a:fld>
             <a:endParaRPr lang="en-US"/>
           </a:p>
@@ -746,7 +747,7 @@
           <a:p>
             <a:fld id="{508CA472-7F2E-4E76-B936-E2F0FA71052E}" type="slidenum">
               <a:rPr lang="en-US" smtClean="0"/>
-              <a:t>10</a:t>
+              <a:t>11</a:t>
             </a:fld>
             <a:endParaRPr lang="en-US"/>
           </a:p>
@@ -830,7 +831,7 @@
           <a:p>
             <a:fld id="{508CA472-7F2E-4E76-B936-E2F0FA71052E}" type="slidenum">
               <a:rPr lang="en-US" smtClean="0"/>
-              <a:t>11</a:t>
+              <a:t>12</a:t>
             </a:fld>
             <a:endParaRPr lang="en-US"/>
           </a:p>
@@ -1044,7 +1045,7 @@
           <a:p>
             <a:fld id="{508CA472-7F2E-4E76-B936-E2F0FA71052E}" type="slidenum">
               <a:rPr lang="en-US" smtClean="0"/>
-              <a:t>12</a:t>
+              <a:t>13</a:t>
             </a:fld>
             <a:endParaRPr lang="en-US"/>
           </a:p>
@@ -1128,7 +1129,7 @@
           <a:p>
             <a:fld id="{508CA472-7F2E-4E76-B936-E2F0FA71052E}" type="slidenum">
               <a:rPr lang="en-US" smtClean="0"/>
-              <a:t>13</a:t>
+              <a:t>14</a:t>
             </a:fld>
             <a:endParaRPr lang="en-US"/>
           </a:p>
@@ -1348,7 +1349,7 @@
           <a:p>
             <a:fld id="{508CA472-7F2E-4E76-B936-E2F0FA71052E}" type="slidenum">
               <a:rPr lang="en-US" smtClean="0"/>
-              <a:t>14</a:t>
+              <a:t>15</a:t>
             </a:fld>
             <a:endParaRPr lang="en-US"/>
           </a:p>
@@ -1675,7 +1676,7 @@
           <a:p>
             <a:fld id="{508CA472-7F2E-4E76-B936-E2F0FA71052E}" type="slidenum">
               <a:rPr lang="en-US" smtClean="0"/>
-              <a:t>15</a:t>
+              <a:t>16</a:t>
             </a:fld>
             <a:endParaRPr lang="en-US"/>
           </a:p>
@@ -1776,7 +1777,7 @@
                 <a:cs typeface="Calibri"/>
                 <a:sym typeface="Calibri"/>
               </a:rPr>
-              <a:t>16</a:t>
+              <a:t>17</a:t>
             </a:fld>
             <a:endParaRPr lang="en-US" sz="1200" b="0" i="0" u="none" strike="noStrike" cap="none">
               <a:solidFill>
@@ -1871,7 +1872,7 @@
           <a:p>
             <a:fld id="{508CA472-7F2E-4E76-B936-E2F0FA71052E}" type="slidenum">
               <a:rPr lang="en-US" smtClean="0"/>
-              <a:t>17</a:t>
+              <a:t>18</a:t>
             </a:fld>
             <a:endParaRPr lang="en-US"/>
           </a:p>
@@ -2062,7 +2063,7 @@
           <a:p>
             <a:fld id="{508CA472-7F2E-4E76-B936-E2F0FA71052E}" type="slidenum">
               <a:rPr lang="en-US" smtClean="0"/>
-              <a:t>3</a:t>
+              <a:t>4</a:t>
             </a:fld>
             <a:endParaRPr lang="en-US"/>
           </a:p>
@@ -2169,7 +2170,7 @@
           <a:p>
             <a:fld id="{508CA472-7F2E-4E76-B936-E2F0FA71052E}" type="slidenum">
               <a:rPr lang="en-US" smtClean="0"/>
-              <a:t>4</a:t>
+              <a:t>5</a:t>
             </a:fld>
             <a:endParaRPr lang="en-US"/>
           </a:p>
@@ -2276,7 +2277,7 @@
           <a:p>
             <a:fld id="{508CA472-7F2E-4E76-B936-E2F0FA71052E}" type="slidenum">
               <a:rPr lang="en-US" smtClean="0"/>
-              <a:t>5</a:t>
+              <a:t>6</a:t>
             </a:fld>
             <a:endParaRPr lang="en-US"/>
           </a:p>
@@ -2383,7 +2384,7 @@
           <a:p>
             <a:fld id="{508CA472-7F2E-4E76-B936-E2F0FA71052E}" type="slidenum">
               <a:rPr lang="en-US" smtClean="0"/>
-              <a:t>6</a:t>
+              <a:t>7</a:t>
             </a:fld>
             <a:endParaRPr lang="en-US"/>
           </a:p>
@@ -2467,7 +2468,7 @@
           <a:p>
             <a:fld id="{508CA472-7F2E-4E76-B936-E2F0FA71052E}" type="slidenum">
               <a:rPr lang="en-US" smtClean="0"/>
-              <a:t>7</a:t>
+              <a:t>8</a:t>
             </a:fld>
             <a:endParaRPr lang="en-US"/>
           </a:p>
@@ -2778,7 +2779,7 @@
           <a:p>
             <a:fld id="{508CA472-7F2E-4E76-B936-E2F0FA71052E}" type="slidenum">
               <a:rPr lang="en-US" smtClean="0"/>
-              <a:t>8</a:t>
+              <a:t>9</a:t>
             </a:fld>
             <a:endParaRPr lang="en-US"/>
           </a:p>
@@ -2999,7 +3000,7 @@
           <a:p>
             <a:fld id="{508CA472-7F2E-4E76-B936-E2F0FA71052E}" type="slidenum">
               <a:rPr lang="en-US" smtClean="0"/>
-              <a:t>9</a:t>
+              <a:t>10</a:t>
             </a:fld>
             <a:endParaRPr lang="en-US"/>
           </a:p>
@@ -10770,6 +10771,1268 @@
           <a:chExt cx="0" cy="0"/>
         </a:xfrm>
       </p:grpSpPr>
+      <p:pic>
+        <p:nvPicPr>
+          <p:cNvPr id="5" name="Picture 4">
+            <a:extLst>
+              <a:ext uri="{FF2B5EF4-FFF2-40B4-BE49-F238E27FC236}">
+                <a16:creationId xmlns:a16="http://schemas.microsoft.com/office/drawing/2014/main" id="{AD826950-8BF2-1541-A331-35775917C857}"/>
+              </a:ext>
+            </a:extLst>
+          </p:cNvPr>
+          <p:cNvPicPr>
+            <a:picLocks noChangeAspect="1"/>
+          </p:cNvPicPr>
+          <p:nvPr/>
+        </p:nvPicPr>
+        <p:blipFill>
+          <a:blip r:embed="rId3">
+            <a:extLst>
+              <a:ext uri="{BEBA8EAE-BF5A-486C-A8C5-ECC9F3942E4B}">
+                <a14:imgProps xmlns:a14="http://schemas.microsoft.com/office/drawing/2010/main">
+                  <a14:imgLayer r:embed="rId4">
+                    <a14:imgEffect>
+                      <a14:backgroundRemoval t="7477" b="89720" l="9787" r="89787">
+                        <a14:foregroundMark x1="56596" y1="11215" x2="56596" y2="11215"/>
+                        <a14:foregroundMark x1="55745" y1="7477" x2="52340" y2="9346"/>
+                        <a14:foregroundMark x1="58298" y1="56075" x2="54894" y2="53271"/>
+                      </a14:backgroundRemoval>
+                    </a14:imgEffect>
+                  </a14:imgLayer>
+                </a14:imgProps>
+              </a:ext>
+            </a:extLst>
+          </a:blip>
+          <a:stretch>
+            <a:fillRect/>
+          </a:stretch>
+        </p:blipFill>
+        <p:spPr>
+          <a:xfrm flipH="1">
+            <a:off x="-88385" y="5197695"/>
+            <a:ext cx="1512121" cy="1358900"/>
+          </a:xfrm>
+          <a:prstGeom prst="rect">
+            <a:avLst/>
+          </a:prstGeom>
+        </p:spPr>
+      </p:pic>
+      <p:sp>
+        <p:nvSpPr>
+          <p:cNvPr id="2" name="Title 1">
+            <a:extLst>
+              <a:ext uri="{FF2B5EF4-FFF2-40B4-BE49-F238E27FC236}">
+                <a16:creationId xmlns:a16="http://schemas.microsoft.com/office/drawing/2014/main" id="{45EC0157-B40C-AF46-B7A9-AA876817553D}"/>
+              </a:ext>
+            </a:extLst>
+          </p:cNvPr>
+          <p:cNvSpPr>
+            <a:spLocks noGrp="1"/>
+          </p:cNvSpPr>
+          <p:nvPr>
+            <p:ph type="title"/>
+          </p:nvPr>
+        </p:nvSpPr>
+        <p:spPr/>
+        <p:txBody>
+          <a:bodyPr/>
+          <a:lstStyle/>
+          <a:p>
+            <a:r>
+              <a:rPr lang="en-US"/>
+              <a:t>Query Pruning</a:t>
+            </a:r>
+          </a:p>
+        </p:txBody>
+      </p:sp>
+      <p:sp>
+        <p:nvSpPr>
+          <p:cNvPr id="4" name="Slide Number Placeholder 3">
+            <a:extLst>
+              <a:ext uri="{FF2B5EF4-FFF2-40B4-BE49-F238E27FC236}">
+                <a16:creationId xmlns:a16="http://schemas.microsoft.com/office/drawing/2014/main" id="{C4DFA311-D360-EF4C-A2A3-FF0BCA0792F1}"/>
+              </a:ext>
+            </a:extLst>
+          </p:cNvPr>
+          <p:cNvSpPr>
+            <a:spLocks noGrp="1"/>
+          </p:cNvSpPr>
+          <p:nvPr>
+            <p:ph type="sldNum" idx="12"/>
+          </p:nvPr>
+        </p:nvSpPr>
+        <p:spPr>
+          <a:xfrm>
+            <a:off x="11340000" y="6599097"/>
+            <a:ext cx="834067" cy="298455"/>
+          </a:xfrm>
+        </p:spPr>
+        <p:txBody>
+          <a:bodyPr/>
+          <a:lstStyle/>
+          <a:p>
+            <a:pPr marL="0" lvl="0" indent="0" algn="ctr" rtl="0">
+              <a:spcBef>
+                <a:spcPts val="0"/>
+              </a:spcBef>
+              <a:spcAft>
+                <a:spcPts val="0"/>
+              </a:spcAft>
+              <a:buNone/>
+            </a:pPr>
+            <a:fld id="{00000000-1234-1234-1234-123412341234}" type="slidenum">
+              <a:rPr lang="en-US" smtClean="0"/>
+              <a:t>10</a:t>
+            </a:fld>
+            <a:endParaRPr lang="en-US" dirty="0"/>
+          </a:p>
+        </p:txBody>
+      </p:sp>
+      <p:sp>
+        <p:nvSpPr>
+          <p:cNvPr id="9" name="Text Placeholder 8">
+            <a:extLst>
+              <a:ext uri="{FF2B5EF4-FFF2-40B4-BE49-F238E27FC236}">
+                <a16:creationId xmlns:a16="http://schemas.microsoft.com/office/drawing/2014/main" id="{DCCA0D9A-4A01-4C7A-9188-E2C3FC3F0709}"/>
+              </a:ext>
+            </a:extLst>
+          </p:cNvPr>
+          <p:cNvSpPr>
+            <a:spLocks noGrp="1"/>
+          </p:cNvSpPr>
+          <p:nvPr>
+            <p:ph type="body" idx="1"/>
+          </p:nvPr>
+        </p:nvSpPr>
+        <p:spPr>
+          <a:xfrm>
+            <a:off x="747838" y="1386868"/>
+            <a:ext cx="10512000" cy="4680000"/>
+          </a:xfrm>
+        </p:spPr>
+        <p:txBody>
+          <a:bodyPr/>
+          <a:lstStyle/>
+          <a:p>
+            <a:r>
+              <a:rPr lang="en-US" dirty="0"/>
+              <a:t>Snowflake enables precise pruning of columns in micro-partitions at query run-time, including columns containing semi-structured data</a:t>
+            </a:r>
+          </a:p>
+        </p:txBody>
+      </p:sp>
+      <p:sp>
+        <p:nvSpPr>
+          <p:cNvPr id="6" name="Up-Down Arrow 5">
+            <a:extLst>
+              <a:ext uri="{FF2B5EF4-FFF2-40B4-BE49-F238E27FC236}">
+                <a16:creationId xmlns:a16="http://schemas.microsoft.com/office/drawing/2014/main" id="{0E3388D1-4515-AB4B-81C7-195CE2994400}"/>
+              </a:ext>
+            </a:extLst>
+          </p:cNvPr>
+          <p:cNvSpPr/>
+          <p:nvPr/>
+        </p:nvSpPr>
+        <p:spPr>
+          <a:xfrm>
+            <a:off x="1212214" y="3126390"/>
+            <a:ext cx="207818" cy="3060873"/>
+          </a:xfrm>
+          <a:prstGeom prst="upDownArrow">
+            <a:avLst/>
+          </a:prstGeom>
+        </p:spPr>
+        <p:style>
+          <a:lnRef idx="2">
+            <a:schemeClr val="accent1">
+              <a:shade val="50000"/>
+            </a:schemeClr>
+          </a:lnRef>
+          <a:fillRef idx="1">
+            <a:schemeClr val="accent1"/>
+          </a:fillRef>
+          <a:effectRef idx="0">
+            <a:schemeClr val="accent1"/>
+          </a:effectRef>
+          <a:fontRef idx="minor">
+            <a:schemeClr val="lt1"/>
+          </a:fontRef>
+        </p:style>
+        <p:txBody>
+          <a:bodyPr rtlCol="0" anchor="ctr"/>
+          <a:lstStyle/>
+          <a:p>
+            <a:pPr algn="ctr"/>
+            <a:endParaRPr lang="en-US"/>
+          </a:p>
+        </p:txBody>
+      </p:sp>
+      <p:sp>
+        <p:nvSpPr>
+          <p:cNvPr id="7" name="TextBox 6">
+            <a:extLst>
+              <a:ext uri="{FF2B5EF4-FFF2-40B4-BE49-F238E27FC236}">
+                <a16:creationId xmlns:a16="http://schemas.microsoft.com/office/drawing/2014/main" id="{A5AD76B1-1BBD-8241-9D86-B4356A999D7E}"/>
+              </a:ext>
+            </a:extLst>
+          </p:cNvPr>
+          <p:cNvSpPr txBox="1"/>
+          <p:nvPr/>
+        </p:nvSpPr>
+        <p:spPr>
+          <a:xfrm>
+            <a:off x="1845928" y="2875656"/>
+            <a:ext cx="9518072" cy="369332"/>
+          </a:xfrm>
+          <a:prstGeom prst="rect">
+            <a:avLst/>
+          </a:prstGeom>
+          <a:noFill/>
+        </p:spPr>
+        <p:txBody>
+          <a:bodyPr wrap="square" rtlCol="0">
+            <a:spAutoFit/>
+          </a:bodyPr>
+          <a:lstStyle/>
+          <a:p>
+            <a:r>
+              <a:rPr lang="en-US" dirty="0"/>
+              <a:t>Date 	Hour 	Action	    Action_Category         Feature	     Feature2	Feature3</a:t>
+            </a:r>
+          </a:p>
+        </p:txBody>
+      </p:sp>
+      <p:sp>
+        <p:nvSpPr>
+          <p:cNvPr id="8" name="TextBox 7">
+            <a:extLst>
+              <a:ext uri="{FF2B5EF4-FFF2-40B4-BE49-F238E27FC236}">
+                <a16:creationId xmlns:a16="http://schemas.microsoft.com/office/drawing/2014/main" id="{BA8E3326-3E98-FC45-A080-2EEDCE2DFFDE}"/>
+              </a:ext>
+            </a:extLst>
+          </p:cNvPr>
+          <p:cNvSpPr txBox="1"/>
+          <p:nvPr/>
+        </p:nvSpPr>
+        <p:spPr>
+          <a:xfrm>
+            <a:off x="79574" y="3498952"/>
+            <a:ext cx="1050927" cy="923330"/>
+          </a:xfrm>
+          <a:prstGeom prst="rect">
+            <a:avLst/>
+          </a:prstGeom>
+          <a:noFill/>
+        </p:spPr>
+        <p:txBody>
+          <a:bodyPr wrap="square" rtlCol="0">
+            <a:spAutoFit/>
+          </a:bodyPr>
+          <a:lstStyle/>
+          <a:p>
+            <a:pPr algn="ctr"/>
+            <a:r>
+              <a:rPr lang="en-US" dirty="0"/>
+              <a:t>1 year's worth of data</a:t>
+            </a:r>
+          </a:p>
+        </p:txBody>
+      </p:sp>
+      <p:sp>
+        <p:nvSpPr>
+          <p:cNvPr id="10" name="TextBox 9">
+            <a:extLst>
+              <a:ext uri="{FF2B5EF4-FFF2-40B4-BE49-F238E27FC236}">
+                <a16:creationId xmlns:a16="http://schemas.microsoft.com/office/drawing/2014/main" id="{2B76207B-04FF-FF44-AC89-AF55B3DCC09F}"/>
+              </a:ext>
+            </a:extLst>
+          </p:cNvPr>
+          <p:cNvSpPr txBox="1"/>
+          <p:nvPr/>
+        </p:nvSpPr>
+        <p:spPr>
+          <a:xfrm>
+            <a:off x="1350764" y="3244988"/>
+            <a:ext cx="1219254" cy="3108543"/>
+          </a:xfrm>
+          <a:prstGeom prst="rect">
+            <a:avLst/>
+          </a:prstGeom>
+          <a:noFill/>
+        </p:spPr>
+        <p:txBody>
+          <a:bodyPr wrap="square" rtlCol="0">
+            <a:spAutoFit/>
+          </a:bodyPr>
+          <a:lstStyle/>
+          <a:p>
+            <a:pPr algn="r"/>
+            <a:r>
+              <a:rPr lang="en-US" sz="1400" dirty="0"/>
+              <a:t>1/1/2019</a:t>
+            </a:r>
+          </a:p>
+          <a:p>
+            <a:pPr algn="r"/>
+            <a:r>
+              <a:rPr lang="en-US" sz="1400" dirty="0"/>
+              <a:t>1/2/2019</a:t>
+            </a:r>
+          </a:p>
+          <a:p>
+            <a:pPr algn="r"/>
+            <a:r>
+              <a:rPr lang="en-US" sz="1400" dirty="0"/>
+              <a:t>.</a:t>
+            </a:r>
+          </a:p>
+          <a:p>
+            <a:pPr algn="r"/>
+            <a:r>
+              <a:rPr lang="en-US" sz="1400" dirty="0"/>
+              <a:t>.</a:t>
+            </a:r>
+          </a:p>
+          <a:p>
+            <a:pPr algn="r"/>
+            <a:r>
+              <a:rPr lang="en-US" sz="1400" dirty="0"/>
+              <a:t>.</a:t>
+            </a:r>
+          </a:p>
+          <a:p>
+            <a:pPr algn="r"/>
+            <a:r>
+              <a:rPr lang="en-US" sz="1400" dirty="0"/>
+              <a:t>.</a:t>
+            </a:r>
+          </a:p>
+          <a:p>
+            <a:pPr algn="r"/>
+            <a:r>
+              <a:rPr lang="en-US" sz="1400" dirty="0"/>
+              <a:t>.</a:t>
+            </a:r>
+          </a:p>
+          <a:p>
+            <a:pPr algn="r"/>
+            <a:r>
+              <a:rPr lang="en-US" sz="1400" dirty="0"/>
+              <a:t>7/14/2019</a:t>
+            </a:r>
+          </a:p>
+          <a:p>
+            <a:pPr algn="r"/>
+            <a:r>
+              <a:rPr lang="en-US" sz="1400" dirty="0"/>
+              <a:t>.</a:t>
+            </a:r>
+          </a:p>
+          <a:p>
+            <a:pPr algn="r"/>
+            <a:r>
+              <a:rPr lang="en-US" sz="1400" dirty="0"/>
+              <a:t>.</a:t>
+            </a:r>
+          </a:p>
+          <a:p>
+            <a:pPr algn="r"/>
+            <a:r>
+              <a:rPr lang="en-US" sz="1400" dirty="0"/>
+              <a:t>.</a:t>
+            </a:r>
+          </a:p>
+          <a:p>
+            <a:pPr algn="r"/>
+            <a:r>
+              <a:rPr lang="en-US" sz="1400" dirty="0"/>
+              <a:t>.</a:t>
+            </a:r>
+          </a:p>
+          <a:p>
+            <a:pPr algn="r"/>
+            <a:r>
+              <a:rPr lang="en-US" sz="1400" dirty="0"/>
+              <a:t>12/31/2019</a:t>
+            </a:r>
+          </a:p>
+          <a:p>
+            <a:endParaRPr lang="en-US" sz="1400" dirty="0"/>
+          </a:p>
+        </p:txBody>
+      </p:sp>
+      <p:sp>
+        <p:nvSpPr>
+          <p:cNvPr id="11" name="TextBox 10">
+            <a:extLst>
+              <a:ext uri="{FF2B5EF4-FFF2-40B4-BE49-F238E27FC236}">
+                <a16:creationId xmlns:a16="http://schemas.microsoft.com/office/drawing/2014/main" id="{0A14B92F-34BE-E145-8FB7-66B5803F7E22}"/>
+              </a:ext>
+            </a:extLst>
+          </p:cNvPr>
+          <p:cNvSpPr txBox="1"/>
+          <p:nvPr/>
+        </p:nvSpPr>
+        <p:spPr>
+          <a:xfrm>
+            <a:off x="2247737" y="3225028"/>
+            <a:ext cx="1219254" cy="3108543"/>
+          </a:xfrm>
+          <a:prstGeom prst="rect">
+            <a:avLst/>
+          </a:prstGeom>
+          <a:noFill/>
+        </p:spPr>
+        <p:txBody>
+          <a:bodyPr wrap="square" rtlCol="0">
+            <a:spAutoFit/>
+          </a:bodyPr>
+          <a:lstStyle/>
+          <a:p>
+            <a:pPr algn="r"/>
+            <a:r>
+              <a:rPr lang="en-US" sz="1400" dirty="0"/>
+              <a:t>1pm</a:t>
+            </a:r>
+          </a:p>
+          <a:p>
+            <a:pPr algn="r"/>
+            <a:r>
+              <a:rPr lang="en-US" sz="1400" dirty="0"/>
+              <a:t>12am</a:t>
+            </a:r>
+          </a:p>
+          <a:p>
+            <a:pPr algn="r"/>
+            <a:r>
+              <a:rPr lang="en-US" sz="1400" dirty="0"/>
+              <a:t>.</a:t>
+            </a:r>
+          </a:p>
+          <a:p>
+            <a:pPr algn="r"/>
+            <a:r>
+              <a:rPr lang="en-US" sz="1400" dirty="0"/>
+              <a:t>.</a:t>
+            </a:r>
+          </a:p>
+          <a:p>
+            <a:pPr algn="r"/>
+            <a:r>
+              <a:rPr lang="en-US" sz="1400" dirty="0"/>
+              <a:t>.</a:t>
+            </a:r>
+          </a:p>
+          <a:p>
+            <a:pPr algn="r"/>
+            <a:r>
+              <a:rPr lang="en-US" sz="1400" dirty="0"/>
+              <a:t>.</a:t>
+            </a:r>
+          </a:p>
+          <a:p>
+            <a:pPr algn="r"/>
+            <a:r>
+              <a:rPr lang="en-US" sz="1400" dirty="0"/>
+              <a:t>.</a:t>
+            </a:r>
+          </a:p>
+          <a:p>
+            <a:pPr algn="r"/>
+            <a:r>
+              <a:rPr lang="en-US" sz="1400" dirty="0"/>
+              <a:t>4pm</a:t>
+            </a:r>
+          </a:p>
+          <a:p>
+            <a:pPr algn="r"/>
+            <a:r>
+              <a:rPr lang="en-US" sz="1400" dirty="0"/>
+              <a:t>.</a:t>
+            </a:r>
+          </a:p>
+          <a:p>
+            <a:pPr algn="r"/>
+            <a:r>
+              <a:rPr lang="en-US" sz="1400" dirty="0"/>
+              <a:t>.</a:t>
+            </a:r>
+          </a:p>
+          <a:p>
+            <a:pPr algn="r"/>
+            <a:r>
+              <a:rPr lang="en-US" sz="1400" dirty="0"/>
+              <a:t>.</a:t>
+            </a:r>
+          </a:p>
+          <a:p>
+            <a:pPr algn="r"/>
+            <a:r>
+              <a:rPr lang="en-US" sz="1400" dirty="0"/>
+              <a:t>.</a:t>
+            </a:r>
+          </a:p>
+          <a:p>
+            <a:pPr algn="r"/>
+            <a:r>
+              <a:rPr lang="en-US" sz="1400" dirty="0"/>
+              <a:t>3am</a:t>
+            </a:r>
+          </a:p>
+          <a:p>
+            <a:endParaRPr lang="en-US" sz="1400" dirty="0"/>
+          </a:p>
+        </p:txBody>
+      </p:sp>
+      <p:sp>
+        <p:nvSpPr>
+          <p:cNvPr id="12" name="TextBox 11">
+            <a:extLst>
+              <a:ext uri="{FF2B5EF4-FFF2-40B4-BE49-F238E27FC236}">
+                <a16:creationId xmlns:a16="http://schemas.microsoft.com/office/drawing/2014/main" id="{017BADD4-D7E5-2B4B-BF49-D80696C6DBD2}"/>
+              </a:ext>
+            </a:extLst>
+          </p:cNvPr>
+          <p:cNvSpPr txBox="1"/>
+          <p:nvPr/>
+        </p:nvSpPr>
+        <p:spPr>
+          <a:xfrm>
+            <a:off x="3253106" y="3225028"/>
+            <a:ext cx="1219254" cy="3108543"/>
+          </a:xfrm>
+          <a:prstGeom prst="rect">
+            <a:avLst/>
+          </a:prstGeom>
+          <a:noFill/>
+        </p:spPr>
+        <p:txBody>
+          <a:bodyPr wrap="square" rtlCol="0">
+            <a:spAutoFit/>
+          </a:bodyPr>
+          <a:lstStyle/>
+          <a:p>
+            <a:pPr algn="r"/>
+            <a:r>
+              <a:rPr lang="en-US" sz="1400" dirty="0"/>
+              <a:t>xxxxx</a:t>
+            </a:r>
+          </a:p>
+          <a:p>
+            <a:pPr algn="r"/>
+            <a:r>
+              <a:rPr lang="en-US" sz="1400" dirty="0"/>
+              <a:t>yyyyy</a:t>
+            </a:r>
+          </a:p>
+          <a:p>
+            <a:pPr algn="r"/>
+            <a:r>
+              <a:rPr lang="en-US" sz="1400" dirty="0"/>
+              <a:t>.</a:t>
+            </a:r>
+          </a:p>
+          <a:p>
+            <a:pPr algn="r"/>
+            <a:r>
+              <a:rPr lang="en-US" sz="1400" dirty="0"/>
+              <a:t>.</a:t>
+            </a:r>
+          </a:p>
+          <a:p>
+            <a:pPr algn="r"/>
+            <a:r>
+              <a:rPr lang="en-US" sz="1400" dirty="0"/>
+              <a:t>.</a:t>
+            </a:r>
+          </a:p>
+          <a:p>
+            <a:pPr algn="r"/>
+            <a:r>
+              <a:rPr lang="en-US" sz="1400" dirty="0"/>
+              <a:t>.</a:t>
+            </a:r>
+          </a:p>
+          <a:p>
+            <a:pPr algn="r"/>
+            <a:r>
+              <a:rPr lang="en-US" sz="1400" dirty="0"/>
+              <a:t>.</a:t>
+            </a:r>
+          </a:p>
+          <a:p>
+            <a:pPr algn="r"/>
+            <a:r>
+              <a:rPr lang="en-US" sz="1400" dirty="0"/>
+              <a:t>zzzzz</a:t>
+            </a:r>
+          </a:p>
+          <a:p>
+            <a:pPr algn="r"/>
+            <a:r>
+              <a:rPr lang="en-US" sz="1400" dirty="0"/>
+              <a:t>.</a:t>
+            </a:r>
+          </a:p>
+          <a:p>
+            <a:pPr algn="r"/>
+            <a:r>
+              <a:rPr lang="en-US" sz="1400" dirty="0"/>
+              <a:t>.</a:t>
+            </a:r>
+          </a:p>
+          <a:p>
+            <a:pPr algn="r"/>
+            <a:r>
+              <a:rPr lang="en-US" sz="1400" dirty="0"/>
+              <a:t>.</a:t>
+            </a:r>
+          </a:p>
+          <a:p>
+            <a:pPr algn="r"/>
+            <a:r>
+              <a:rPr lang="en-US" sz="1400" dirty="0"/>
+              <a:t>.</a:t>
+            </a:r>
+          </a:p>
+          <a:p>
+            <a:pPr algn="r"/>
+            <a:r>
+              <a:rPr lang="en-US" sz="1400" dirty="0"/>
+              <a:t>www</a:t>
+            </a:r>
+          </a:p>
+          <a:p>
+            <a:endParaRPr lang="en-US" sz="1400" dirty="0"/>
+          </a:p>
+        </p:txBody>
+      </p:sp>
+      <p:sp>
+        <p:nvSpPr>
+          <p:cNvPr id="13" name="TextBox 12">
+            <a:extLst>
+              <a:ext uri="{FF2B5EF4-FFF2-40B4-BE49-F238E27FC236}">
+                <a16:creationId xmlns:a16="http://schemas.microsoft.com/office/drawing/2014/main" id="{FB86DFB9-E3EF-5846-8BAF-0D9174829DAE}"/>
+              </a:ext>
+            </a:extLst>
+          </p:cNvPr>
+          <p:cNvSpPr txBox="1"/>
+          <p:nvPr/>
+        </p:nvSpPr>
+        <p:spPr>
+          <a:xfrm>
+            <a:off x="4784584" y="3236161"/>
+            <a:ext cx="1219254" cy="3108543"/>
+          </a:xfrm>
+          <a:prstGeom prst="rect">
+            <a:avLst/>
+          </a:prstGeom>
+          <a:noFill/>
+        </p:spPr>
+        <p:txBody>
+          <a:bodyPr wrap="square" rtlCol="0">
+            <a:spAutoFit/>
+          </a:bodyPr>
+          <a:lstStyle/>
+          <a:p>
+            <a:pPr algn="r"/>
+            <a:r>
+              <a:rPr lang="en-US" sz="1400" dirty="0"/>
+              <a:t>xxxxx</a:t>
+            </a:r>
+          </a:p>
+          <a:p>
+            <a:pPr algn="r"/>
+            <a:r>
+              <a:rPr lang="en-US" sz="1400" dirty="0"/>
+              <a:t>yyyyy</a:t>
+            </a:r>
+          </a:p>
+          <a:p>
+            <a:pPr algn="r"/>
+            <a:r>
+              <a:rPr lang="en-US" sz="1400" dirty="0"/>
+              <a:t>.</a:t>
+            </a:r>
+          </a:p>
+          <a:p>
+            <a:pPr algn="r"/>
+            <a:r>
+              <a:rPr lang="en-US" sz="1400" dirty="0"/>
+              <a:t>.</a:t>
+            </a:r>
+          </a:p>
+          <a:p>
+            <a:pPr algn="r"/>
+            <a:r>
+              <a:rPr lang="en-US" sz="1400" dirty="0"/>
+              <a:t>.</a:t>
+            </a:r>
+          </a:p>
+          <a:p>
+            <a:pPr algn="r"/>
+            <a:r>
+              <a:rPr lang="en-US" sz="1400" dirty="0"/>
+              <a:t>.</a:t>
+            </a:r>
+          </a:p>
+          <a:p>
+            <a:pPr algn="r"/>
+            <a:r>
+              <a:rPr lang="en-US" sz="1400" dirty="0"/>
+              <a:t>.</a:t>
+            </a:r>
+          </a:p>
+          <a:p>
+            <a:pPr algn="r"/>
+            <a:r>
+              <a:rPr lang="en-US" sz="1400" dirty="0"/>
+              <a:t>zzzzz</a:t>
+            </a:r>
+          </a:p>
+          <a:p>
+            <a:pPr algn="r"/>
+            <a:r>
+              <a:rPr lang="en-US" sz="1400" dirty="0"/>
+              <a:t>.</a:t>
+            </a:r>
+          </a:p>
+          <a:p>
+            <a:pPr algn="r"/>
+            <a:r>
+              <a:rPr lang="en-US" sz="1400" dirty="0"/>
+              <a:t>.</a:t>
+            </a:r>
+          </a:p>
+          <a:p>
+            <a:pPr algn="r"/>
+            <a:r>
+              <a:rPr lang="en-US" sz="1400" dirty="0"/>
+              <a:t>.</a:t>
+            </a:r>
+          </a:p>
+          <a:p>
+            <a:pPr algn="r"/>
+            <a:r>
+              <a:rPr lang="en-US" sz="1400" dirty="0"/>
+              <a:t>.</a:t>
+            </a:r>
+          </a:p>
+          <a:p>
+            <a:pPr algn="r"/>
+            <a:r>
+              <a:rPr lang="en-US" sz="1400" dirty="0"/>
+              <a:t>www</a:t>
+            </a:r>
+          </a:p>
+          <a:p>
+            <a:endParaRPr lang="en-US" sz="1400" dirty="0"/>
+          </a:p>
+        </p:txBody>
+      </p:sp>
+      <p:sp>
+        <p:nvSpPr>
+          <p:cNvPr id="14" name="TextBox 13">
+            <a:extLst>
+              <a:ext uri="{FF2B5EF4-FFF2-40B4-BE49-F238E27FC236}">
+                <a16:creationId xmlns:a16="http://schemas.microsoft.com/office/drawing/2014/main" id="{2A370076-CFF4-2B43-9C5A-77CB10A805D3}"/>
+              </a:ext>
+            </a:extLst>
+          </p:cNvPr>
+          <p:cNvSpPr txBox="1"/>
+          <p:nvPr/>
+        </p:nvSpPr>
+        <p:spPr>
+          <a:xfrm>
+            <a:off x="6686926" y="3261506"/>
+            <a:ext cx="1219254" cy="3108543"/>
+          </a:xfrm>
+          <a:prstGeom prst="rect">
+            <a:avLst/>
+          </a:prstGeom>
+          <a:noFill/>
+        </p:spPr>
+        <p:txBody>
+          <a:bodyPr wrap="square" rtlCol="0">
+            <a:spAutoFit/>
+          </a:bodyPr>
+          <a:lstStyle/>
+          <a:p>
+            <a:pPr algn="r"/>
+            <a:r>
+              <a:rPr lang="en-US" sz="1400" dirty="0"/>
+              <a:t>xxxxx</a:t>
+            </a:r>
+          </a:p>
+          <a:p>
+            <a:pPr algn="r"/>
+            <a:r>
+              <a:rPr lang="en-US" sz="1400" dirty="0"/>
+              <a:t>yyyyy</a:t>
+            </a:r>
+          </a:p>
+          <a:p>
+            <a:pPr algn="r"/>
+            <a:r>
+              <a:rPr lang="en-US" sz="1400" dirty="0"/>
+              <a:t>.</a:t>
+            </a:r>
+          </a:p>
+          <a:p>
+            <a:pPr algn="r"/>
+            <a:r>
+              <a:rPr lang="en-US" sz="1400" dirty="0"/>
+              <a:t>.</a:t>
+            </a:r>
+          </a:p>
+          <a:p>
+            <a:pPr algn="r"/>
+            <a:r>
+              <a:rPr lang="en-US" sz="1400" dirty="0"/>
+              <a:t>.</a:t>
+            </a:r>
+          </a:p>
+          <a:p>
+            <a:pPr algn="r"/>
+            <a:r>
+              <a:rPr lang="en-US" sz="1400" dirty="0"/>
+              <a:t>.</a:t>
+            </a:r>
+          </a:p>
+          <a:p>
+            <a:pPr algn="r"/>
+            <a:r>
+              <a:rPr lang="en-US" sz="1400" dirty="0"/>
+              <a:t>.</a:t>
+            </a:r>
+          </a:p>
+          <a:p>
+            <a:pPr algn="r"/>
+            <a:r>
+              <a:rPr lang="en-US" sz="1400" dirty="0"/>
+              <a:t>zzzzz</a:t>
+            </a:r>
+          </a:p>
+          <a:p>
+            <a:pPr algn="r"/>
+            <a:r>
+              <a:rPr lang="en-US" sz="1400" dirty="0"/>
+              <a:t>.</a:t>
+            </a:r>
+          </a:p>
+          <a:p>
+            <a:pPr algn="r"/>
+            <a:r>
+              <a:rPr lang="en-US" sz="1400" dirty="0"/>
+              <a:t>.</a:t>
+            </a:r>
+          </a:p>
+          <a:p>
+            <a:pPr algn="r"/>
+            <a:r>
+              <a:rPr lang="en-US" sz="1400" dirty="0"/>
+              <a:t>.</a:t>
+            </a:r>
+          </a:p>
+          <a:p>
+            <a:pPr algn="r"/>
+            <a:r>
+              <a:rPr lang="en-US" sz="1400" dirty="0"/>
+              <a:t>.</a:t>
+            </a:r>
+          </a:p>
+          <a:p>
+            <a:pPr algn="r"/>
+            <a:r>
+              <a:rPr lang="en-US" sz="1400" dirty="0"/>
+              <a:t>www</a:t>
+            </a:r>
+          </a:p>
+          <a:p>
+            <a:endParaRPr lang="en-US" sz="1400" dirty="0"/>
+          </a:p>
+        </p:txBody>
+      </p:sp>
+      <p:sp>
+        <p:nvSpPr>
+          <p:cNvPr id="15" name="TextBox 14">
+            <a:extLst>
+              <a:ext uri="{FF2B5EF4-FFF2-40B4-BE49-F238E27FC236}">
+                <a16:creationId xmlns:a16="http://schemas.microsoft.com/office/drawing/2014/main" id="{680CDA20-AC18-4C41-8C27-4BFA3412A04E}"/>
+              </a:ext>
+            </a:extLst>
+          </p:cNvPr>
+          <p:cNvSpPr txBox="1"/>
+          <p:nvPr/>
+        </p:nvSpPr>
+        <p:spPr>
+          <a:xfrm>
+            <a:off x="8156701" y="3225028"/>
+            <a:ext cx="1219254" cy="3108543"/>
+          </a:xfrm>
+          <a:prstGeom prst="rect">
+            <a:avLst/>
+          </a:prstGeom>
+          <a:noFill/>
+        </p:spPr>
+        <p:txBody>
+          <a:bodyPr wrap="square" rtlCol="0">
+            <a:spAutoFit/>
+          </a:bodyPr>
+          <a:lstStyle/>
+          <a:p>
+            <a:pPr algn="r"/>
+            <a:r>
+              <a:rPr lang="en-US" sz="1400" dirty="0"/>
+              <a:t>xxxxx</a:t>
+            </a:r>
+          </a:p>
+          <a:p>
+            <a:pPr algn="r"/>
+            <a:r>
+              <a:rPr lang="en-US" sz="1400" dirty="0"/>
+              <a:t>yyyyy</a:t>
+            </a:r>
+          </a:p>
+          <a:p>
+            <a:pPr algn="r"/>
+            <a:r>
+              <a:rPr lang="en-US" sz="1400" dirty="0"/>
+              <a:t>.</a:t>
+            </a:r>
+          </a:p>
+          <a:p>
+            <a:pPr algn="r"/>
+            <a:r>
+              <a:rPr lang="en-US" sz="1400" dirty="0"/>
+              <a:t>.</a:t>
+            </a:r>
+          </a:p>
+          <a:p>
+            <a:pPr algn="r"/>
+            <a:r>
+              <a:rPr lang="en-US" sz="1400" dirty="0"/>
+              <a:t>.</a:t>
+            </a:r>
+          </a:p>
+          <a:p>
+            <a:pPr algn="r"/>
+            <a:r>
+              <a:rPr lang="en-US" sz="1400" dirty="0"/>
+              <a:t>.</a:t>
+            </a:r>
+          </a:p>
+          <a:p>
+            <a:pPr algn="r"/>
+            <a:r>
+              <a:rPr lang="en-US" sz="1400" dirty="0"/>
+              <a:t>.</a:t>
+            </a:r>
+          </a:p>
+          <a:p>
+            <a:pPr algn="r"/>
+            <a:r>
+              <a:rPr lang="en-US" sz="1400" dirty="0"/>
+              <a:t>zzzzz</a:t>
+            </a:r>
+          </a:p>
+          <a:p>
+            <a:pPr algn="r"/>
+            <a:r>
+              <a:rPr lang="en-US" sz="1400" dirty="0"/>
+              <a:t>.</a:t>
+            </a:r>
+          </a:p>
+          <a:p>
+            <a:pPr algn="r"/>
+            <a:r>
+              <a:rPr lang="en-US" sz="1400" dirty="0"/>
+              <a:t>.</a:t>
+            </a:r>
+          </a:p>
+          <a:p>
+            <a:pPr algn="r"/>
+            <a:r>
+              <a:rPr lang="en-US" sz="1400" dirty="0"/>
+              <a:t>.</a:t>
+            </a:r>
+          </a:p>
+          <a:p>
+            <a:pPr algn="r"/>
+            <a:r>
+              <a:rPr lang="en-US" sz="1400" dirty="0"/>
+              <a:t>.</a:t>
+            </a:r>
+          </a:p>
+          <a:p>
+            <a:pPr algn="r"/>
+            <a:r>
+              <a:rPr lang="en-US" sz="1400" dirty="0"/>
+              <a:t>www</a:t>
+            </a:r>
+          </a:p>
+          <a:p>
+            <a:endParaRPr lang="en-US" sz="1400" dirty="0"/>
+          </a:p>
+        </p:txBody>
+      </p:sp>
+      <p:sp>
+        <p:nvSpPr>
+          <p:cNvPr id="16" name="TextBox 15">
+            <a:extLst>
+              <a:ext uri="{FF2B5EF4-FFF2-40B4-BE49-F238E27FC236}">
+                <a16:creationId xmlns:a16="http://schemas.microsoft.com/office/drawing/2014/main" id="{6E8D7745-A94A-1041-8B77-35A3276E50F8}"/>
+              </a:ext>
+            </a:extLst>
+          </p:cNvPr>
+          <p:cNvSpPr txBox="1"/>
+          <p:nvPr/>
+        </p:nvSpPr>
+        <p:spPr>
+          <a:xfrm>
+            <a:off x="9784256" y="3194297"/>
+            <a:ext cx="1219254" cy="3108543"/>
+          </a:xfrm>
+          <a:prstGeom prst="rect">
+            <a:avLst/>
+          </a:prstGeom>
+          <a:noFill/>
+        </p:spPr>
+        <p:txBody>
+          <a:bodyPr wrap="square" rtlCol="0">
+            <a:spAutoFit/>
+          </a:bodyPr>
+          <a:lstStyle/>
+          <a:p>
+            <a:pPr algn="r"/>
+            <a:r>
+              <a:rPr lang="en-US" sz="1400" dirty="0"/>
+              <a:t>xxxxx</a:t>
+            </a:r>
+          </a:p>
+          <a:p>
+            <a:pPr algn="r"/>
+            <a:r>
+              <a:rPr lang="en-US" sz="1400" dirty="0"/>
+              <a:t>yyyyy</a:t>
+            </a:r>
+          </a:p>
+          <a:p>
+            <a:pPr algn="r"/>
+            <a:r>
+              <a:rPr lang="en-US" sz="1400" dirty="0"/>
+              <a:t>.</a:t>
+            </a:r>
+          </a:p>
+          <a:p>
+            <a:pPr algn="r"/>
+            <a:r>
+              <a:rPr lang="en-US" sz="1400" dirty="0"/>
+              <a:t>.</a:t>
+            </a:r>
+          </a:p>
+          <a:p>
+            <a:pPr algn="r"/>
+            <a:r>
+              <a:rPr lang="en-US" sz="1400" dirty="0"/>
+              <a:t>.</a:t>
+            </a:r>
+          </a:p>
+          <a:p>
+            <a:pPr algn="r"/>
+            <a:r>
+              <a:rPr lang="en-US" sz="1400" dirty="0"/>
+              <a:t>.</a:t>
+            </a:r>
+          </a:p>
+          <a:p>
+            <a:pPr algn="r"/>
+            <a:r>
+              <a:rPr lang="en-US" sz="1400" dirty="0"/>
+              <a:t>.</a:t>
+            </a:r>
+          </a:p>
+          <a:p>
+            <a:pPr algn="r"/>
+            <a:r>
+              <a:rPr lang="en-US" sz="1400" dirty="0"/>
+              <a:t>zzzzz</a:t>
+            </a:r>
+          </a:p>
+          <a:p>
+            <a:pPr algn="r"/>
+            <a:r>
+              <a:rPr lang="en-US" sz="1400" dirty="0"/>
+              <a:t>.</a:t>
+            </a:r>
+          </a:p>
+          <a:p>
+            <a:pPr algn="r"/>
+            <a:r>
+              <a:rPr lang="en-US" sz="1400" dirty="0"/>
+              <a:t>.</a:t>
+            </a:r>
+          </a:p>
+          <a:p>
+            <a:pPr algn="r"/>
+            <a:r>
+              <a:rPr lang="en-US" sz="1400" dirty="0"/>
+              <a:t>.</a:t>
+            </a:r>
+          </a:p>
+          <a:p>
+            <a:pPr algn="r"/>
+            <a:r>
+              <a:rPr lang="en-US" sz="1400" dirty="0"/>
+              <a:t>.</a:t>
+            </a:r>
+          </a:p>
+          <a:p>
+            <a:pPr algn="r"/>
+            <a:r>
+              <a:rPr lang="en-US" sz="1400" dirty="0"/>
+              <a:t>www</a:t>
+            </a:r>
+          </a:p>
+          <a:p>
+            <a:endParaRPr lang="en-US" sz="1400" dirty="0"/>
+          </a:p>
+        </p:txBody>
+      </p:sp>
+      <p:sp>
+        <p:nvSpPr>
+          <p:cNvPr id="17" name="Rectangle 16">
+            <a:extLst>
+              <a:ext uri="{FF2B5EF4-FFF2-40B4-BE49-F238E27FC236}">
+                <a16:creationId xmlns:a16="http://schemas.microsoft.com/office/drawing/2014/main" id="{7B2A60A1-B999-2F45-B517-F13014CAA018}"/>
+              </a:ext>
+            </a:extLst>
+          </p:cNvPr>
+          <p:cNvSpPr/>
+          <p:nvPr/>
+        </p:nvSpPr>
+        <p:spPr>
+          <a:xfrm>
+            <a:off x="2691403" y="2715485"/>
+            <a:ext cx="886428" cy="3471778"/>
+          </a:xfrm>
+          <a:prstGeom prst="rect">
+            <a:avLst/>
+          </a:prstGeom>
+          <a:noFill/>
+          <a:ln>
+            <a:solidFill>
+              <a:srgbClr val="92D050"/>
+            </a:solidFill>
+          </a:ln>
+        </p:spPr>
+        <p:style>
+          <a:lnRef idx="2">
+            <a:schemeClr val="accent1">
+              <a:shade val="50000"/>
+            </a:schemeClr>
+          </a:lnRef>
+          <a:fillRef idx="1">
+            <a:schemeClr val="accent1"/>
+          </a:fillRef>
+          <a:effectRef idx="0">
+            <a:schemeClr val="accent1"/>
+          </a:effectRef>
+          <a:fontRef idx="minor">
+            <a:schemeClr val="lt1"/>
+          </a:fontRef>
+        </p:style>
+        <p:txBody>
+          <a:bodyPr rtlCol="0" anchor="ctr"/>
+          <a:lstStyle/>
+          <a:p>
+            <a:pPr algn="ctr"/>
+            <a:endParaRPr lang="en-US"/>
+          </a:p>
+        </p:txBody>
+      </p:sp>
+      <p:sp>
+        <p:nvSpPr>
+          <p:cNvPr id="18" name="Rectangle 17">
+            <a:extLst>
+              <a:ext uri="{FF2B5EF4-FFF2-40B4-BE49-F238E27FC236}">
+                <a16:creationId xmlns:a16="http://schemas.microsoft.com/office/drawing/2014/main" id="{9767D559-68F6-6840-8E8E-7688993741A2}"/>
+              </a:ext>
+            </a:extLst>
+          </p:cNvPr>
+          <p:cNvSpPr/>
+          <p:nvPr/>
+        </p:nvSpPr>
+        <p:spPr>
+          <a:xfrm>
+            <a:off x="1475453" y="3498952"/>
+            <a:ext cx="9888548" cy="227916"/>
+          </a:xfrm>
+          <a:prstGeom prst="rect">
+            <a:avLst/>
+          </a:prstGeom>
+          <a:noFill/>
+          <a:ln>
+            <a:solidFill>
+              <a:srgbClr val="92D050"/>
+            </a:solidFill>
+          </a:ln>
+        </p:spPr>
+        <p:style>
+          <a:lnRef idx="2">
+            <a:schemeClr val="accent1">
+              <a:shade val="50000"/>
+            </a:schemeClr>
+          </a:lnRef>
+          <a:fillRef idx="1">
+            <a:schemeClr val="accent1"/>
+          </a:fillRef>
+          <a:effectRef idx="0">
+            <a:schemeClr val="accent1"/>
+          </a:effectRef>
+          <a:fontRef idx="minor">
+            <a:schemeClr val="lt1"/>
+          </a:fontRef>
+        </p:style>
+        <p:txBody>
+          <a:bodyPr rtlCol="0" anchor="ctr"/>
+          <a:lstStyle/>
+          <a:p>
+            <a:pPr algn="ctr"/>
+            <a:endParaRPr lang="en-US"/>
+          </a:p>
+        </p:txBody>
+      </p:sp>
+    </p:spTree>
+    <p:extLst>
+      <p:ext uri="{BB962C8B-B14F-4D97-AF65-F5344CB8AC3E}">
+        <p14:creationId xmlns:p14="http://schemas.microsoft.com/office/powerpoint/2010/main" val="3389296006"/>
+      </p:ext>
+    </p:extLst>
+  </p:cSld>
+  <p:clrMapOvr>
+    <a:masterClrMapping/>
+  </p:clrMapOvr>
+</p:sld>
+</file>
+
+<file path=ppt/slides/slide11.xml><?xml version="1.0" encoding="utf-8"?>
+<p:sld xmlns:a="http://schemas.openxmlformats.org/drawingml/2006/main" xmlns:r="http://schemas.openxmlformats.org/officeDocument/2006/relationships" xmlns:p="http://schemas.openxmlformats.org/presentationml/2006/main">
+  <p:cSld>
+    <p:spTree>
+      <p:nvGrpSpPr>
+        <p:cNvPr id="1" name=""/>
+        <p:cNvGrpSpPr/>
+        <p:nvPr/>
+      </p:nvGrpSpPr>
+      <p:grpSpPr>
+        <a:xfrm>
+          <a:off x="0" y="0"/>
+          <a:ext cx="0" cy="0"/>
+          <a:chOff x="0" y="0"/>
+          <a:chExt cx="0" cy="0"/>
+        </a:xfrm>
+      </p:grpSpPr>
       <p:sp>
         <p:nvSpPr>
           <p:cNvPr id="2" name="Title 1">
@@ -10830,7 +12093,7 @@
             </a:pPr>
             <a:fld id="{00000000-1234-1234-1234-123412341234}" type="slidenum">
               <a:rPr lang="en-US" smtClean="0"/>
-              <a:t>10</a:t>
+              <a:t>11</a:t>
             </a:fld>
             <a:endParaRPr lang="en-US"/>
           </a:p>
@@ -10971,7 +12234,7 @@
 </p:sld>
 </file>
 
-<file path=ppt/slides/slide11.xml><?xml version="1.0" encoding="utf-8"?>
+<file path=ppt/slides/slide12.xml><?xml version="1.0" encoding="utf-8"?>
 <p:sld xmlns:a="http://schemas.openxmlformats.org/drawingml/2006/main" xmlns:r="http://schemas.openxmlformats.org/officeDocument/2006/relationships" xmlns:p="http://schemas.openxmlformats.org/presentationml/2006/main">
   <p:cSld>
     <p:spTree>
@@ -11048,7 +12311,7 @@
             </a:pPr>
             <a:fld id="{00000000-1234-1234-1234-123412341234}" type="slidenum">
               <a:rPr lang="en-US" smtClean="0"/>
-              <a:t>11</a:t>
+              <a:t>12</a:t>
             </a:fld>
             <a:endParaRPr lang="en-US"/>
           </a:p>
@@ -11541,7 +12804,7 @@
 </p:sld>
 </file>
 
-<file path=ppt/slides/slide12.xml><?xml version="1.0" encoding="utf-8"?>
+<file path=ppt/slides/slide13.xml><?xml version="1.0" encoding="utf-8"?>
 <p:sld xmlns:a="http://schemas.openxmlformats.org/drawingml/2006/main" xmlns:r="http://schemas.openxmlformats.org/officeDocument/2006/relationships" xmlns:p="http://schemas.openxmlformats.org/presentationml/2006/main">
   <p:cSld>
     <p:spTree>
@@ -11666,7 +12929,7 @@
             </a:pPr>
             <a:fld id="{00000000-1234-1234-1234-123412341234}" type="slidenum">
               <a:rPr lang="en-US" smtClean="0"/>
-              <a:t>12</a:t>
+              <a:t>13</a:t>
             </a:fld>
             <a:endParaRPr lang="en-US"/>
           </a:p>
@@ -12332,7 +13595,7 @@
 </p:sld>
 </file>
 
-<file path=ppt/slides/slide13.xml><?xml version="1.0" encoding="utf-8"?>
+<file path=ppt/slides/slide14.xml><?xml version="1.0" encoding="utf-8"?>
 <p:sld xmlns:a="http://schemas.openxmlformats.org/drawingml/2006/main" xmlns:r="http://schemas.openxmlformats.org/officeDocument/2006/relationships" xmlns:p="http://schemas.openxmlformats.org/presentationml/2006/main">
   <p:cSld>
     <p:spTree>
@@ -12409,7 +13672,7 @@
             </a:pPr>
             <a:fld id="{00000000-1234-1234-1234-123412341234}" type="slidenum">
               <a:rPr lang="en-US" smtClean="0"/>
-              <a:t>13</a:t>
+              <a:t>14</a:t>
             </a:fld>
             <a:endParaRPr lang="en-US"/>
           </a:p>
@@ -12951,7 +14214,7 @@
 </p:sld>
 </file>
 
-<file path=ppt/slides/slide14.xml><?xml version="1.0" encoding="utf-8"?>
+<file path=ppt/slides/slide15.xml><?xml version="1.0" encoding="utf-8"?>
 <p:sld xmlns:a="http://schemas.openxmlformats.org/drawingml/2006/main" xmlns:r="http://schemas.openxmlformats.org/officeDocument/2006/relationships" xmlns:p="http://schemas.openxmlformats.org/presentationml/2006/main">
   <p:cSld>
     <p:spTree>
@@ -13082,7 +14345,7 @@
             </a:pPr>
             <a:fld id="{00000000-1234-1234-1234-123412341234}" type="slidenum">
               <a:rPr lang="en-US" smtClean="0"/>
-              <a:t>14</a:t>
+              <a:t>15</a:t>
             </a:fld>
             <a:endParaRPr lang="en-US"/>
           </a:p>
@@ -13409,7 +14672,7 @@
 </p:sld>
 </file>
 
-<file path=ppt/slides/slide15.xml><?xml version="1.0" encoding="utf-8"?>
+<file path=ppt/slides/slide16.xml><?xml version="1.0" encoding="utf-8"?>
 <p:sld xmlns:a="http://schemas.openxmlformats.org/drawingml/2006/main" xmlns:r="http://schemas.openxmlformats.org/officeDocument/2006/relationships" xmlns:p="http://schemas.openxmlformats.org/presentationml/2006/main">
   <p:cSld>
     <p:spTree>
@@ -13486,7 +14749,7 @@
             </a:pPr>
             <a:fld id="{00000000-1234-1234-1234-123412341234}" type="slidenum">
               <a:rPr lang="en-US" smtClean="0"/>
-              <a:t>15</a:t>
+              <a:t>16</a:t>
             </a:fld>
             <a:endParaRPr lang="en-US"/>
           </a:p>
@@ -14190,7 +15453,7 @@
 </p:sld>
 </file>
 
-<file path=ppt/slides/slide16.xml><?xml version="1.0" encoding="utf-8"?>
+<file path=ppt/slides/slide17.xml><?xml version="1.0" encoding="utf-8"?>
 <p:sld xmlns:a="http://schemas.openxmlformats.org/drawingml/2006/main" xmlns:r="http://schemas.openxmlformats.org/officeDocument/2006/relationships" xmlns:p="http://schemas.openxmlformats.org/presentationml/2006/main">
   <p:cSld>
     <p:spTree>
@@ -14267,7 +15530,7 @@
             </a:pPr>
             <a:fld id="{00000000-1234-1234-1234-123412341234}" type="slidenum">
               <a:rPr lang="en-US" smtClean="0"/>
-              <a:t>16</a:t>
+              <a:t>17</a:t>
             </a:fld>
             <a:endParaRPr lang="en-US"/>
           </a:p>
@@ -14316,7 +15579,7 @@
 </p:sld>
 </file>
 
-<file path=ppt/slides/slide17.xml><?xml version="1.0" encoding="utf-8"?>
+<file path=ppt/slides/slide18.xml><?xml version="1.0" encoding="utf-8"?>
 <p:sld xmlns:a="http://schemas.openxmlformats.org/drawingml/2006/main" xmlns:r="http://schemas.openxmlformats.org/officeDocument/2006/relationships" xmlns:p="http://schemas.openxmlformats.org/presentationml/2006/main">
   <p:cSld>
     <p:spTree>
@@ -14393,7 +15656,7 @@
             </a:pPr>
             <a:fld id="{00000000-1234-1234-1234-123412341234}" type="slidenum">
               <a:rPr lang="en-US" smtClean="0"/>
-              <a:t>17</a:t>
+              <a:t>18</a:t>
             </a:fld>
             <a:endParaRPr lang="en-US"/>
           </a:p>
@@ -14801,6 +16064,300 @@
           <p:cNvPr id="2" name="Title 1">
             <a:extLst>
               <a:ext uri="{FF2B5EF4-FFF2-40B4-BE49-F238E27FC236}">
+                <a16:creationId xmlns:a16="http://schemas.microsoft.com/office/drawing/2014/main" id="{299213B9-D577-1B4B-B043-08905150D654}"/>
+              </a:ext>
+            </a:extLst>
+          </p:cNvPr>
+          <p:cNvSpPr>
+            <a:spLocks noGrp="1"/>
+          </p:cNvSpPr>
+          <p:nvPr>
+            <p:ph type="title"/>
+          </p:nvPr>
+        </p:nvSpPr>
+        <p:spPr/>
+        <p:txBody>
+          <a:bodyPr/>
+          <a:lstStyle/>
+          <a:p>
+            <a:r>
+              <a:rPr lang="en-US" dirty="0"/>
+              <a:t>Objectives</a:t>
+            </a:r>
+          </a:p>
+        </p:txBody>
+      </p:sp>
+      <p:sp>
+        <p:nvSpPr>
+          <p:cNvPr id="3" name="Text Placeholder 2">
+            <a:extLst>
+              <a:ext uri="{FF2B5EF4-FFF2-40B4-BE49-F238E27FC236}">
+                <a16:creationId xmlns:a16="http://schemas.microsoft.com/office/drawing/2014/main" id="{CA6F5BB7-C821-D644-97D2-E3B7CBF74577}"/>
+              </a:ext>
+            </a:extLst>
+          </p:cNvPr>
+          <p:cNvSpPr>
+            <a:spLocks noGrp="1"/>
+          </p:cNvSpPr>
+          <p:nvPr>
+            <p:ph type="body" idx="1"/>
+          </p:nvPr>
+        </p:nvSpPr>
+        <p:spPr>
+          <a:xfrm>
+            <a:off x="637987" y="1682222"/>
+            <a:ext cx="6398962" cy="4680000"/>
+          </a:xfrm>
+        </p:spPr>
+        <p:txBody>
+          <a:bodyPr/>
+          <a:lstStyle/>
+          <a:p>
+            <a:r>
+              <a:rPr lang="en-US" dirty="0"/>
+              <a:t>Snowflake Data Warehouse Review</a:t>
+            </a:r>
+          </a:p>
+          <a:p>
+            <a:pPr lvl="1"/>
+            <a:r>
+              <a:rPr lang="en-US" dirty="0"/>
+              <a:t>Data Storage</a:t>
+            </a:r>
+          </a:p>
+          <a:p>
+            <a:pPr lvl="1">
+              <a:buFont typeface="Wingdings" pitchFamily="2" charset="2"/>
+              <a:buChar char="Ø"/>
+            </a:pPr>
+            <a:r>
+              <a:rPr lang="en-US" dirty="0"/>
+              <a:t>Query Processing</a:t>
+            </a:r>
+          </a:p>
+          <a:p>
+            <a:pPr lvl="1">
+              <a:buFont typeface="Wingdings" pitchFamily="2" charset="2"/>
+              <a:buChar char="Ø"/>
+            </a:pPr>
+            <a:r>
+              <a:rPr lang="en-US" dirty="0"/>
+              <a:t>Cloud Storage</a:t>
+            </a:r>
+          </a:p>
+          <a:p>
+            <a:r>
+              <a:rPr lang="en-US" dirty="0"/>
+              <a:t>Micro-Partitions vs Static Partitions</a:t>
+            </a:r>
+          </a:p>
+          <a:p>
+            <a:pPr lvl="1"/>
+            <a:r>
+              <a:rPr lang="en-US" dirty="0"/>
+              <a:t>Query Pruning </a:t>
+            </a:r>
+          </a:p>
+          <a:p>
+            <a:pPr lvl="1"/>
+            <a:r>
+              <a:rPr lang="en-US" dirty="0"/>
+              <a:t>Data Clustering </a:t>
+            </a:r>
+          </a:p>
+          <a:p>
+            <a:pPr lvl="1"/>
+            <a:r>
+              <a:rPr lang="en-US" dirty="0"/>
+              <a:t>Clustering Depth </a:t>
+            </a:r>
+          </a:p>
+          <a:p>
+            <a:pPr lvl="1"/>
+            <a:r>
+              <a:rPr lang="en-US" dirty="0"/>
+              <a:t>Clustering Keys</a:t>
+            </a:r>
+          </a:p>
+          <a:p>
+            <a:pPr lvl="1"/>
+            <a:r>
+              <a:rPr lang="en-US" dirty="0"/>
+              <a:t>Benefits</a:t>
+            </a:r>
+          </a:p>
+          <a:p>
+            <a:pPr lvl="1"/>
+            <a:r>
+              <a:rPr lang="en-US" dirty="0"/>
+              <a:t>Strategies</a:t>
+            </a:r>
+          </a:p>
+          <a:p>
+            <a:pPr marL="76200" indent="0">
+              <a:buNone/>
+            </a:pPr>
+            <a:endParaRPr lang="en-US" dirty="0"/>
+          </a:p>
+        </p:txBody>
+      </p:sp>
+      <p:sp>
+        <p:nvSpPr>
+          <p:cNvPr id="4" name="Slide Number Placeholder 3">
+            <a:extLst>
+              <a:ext uri="{FF2B5EF4-FFF2-40B4-BE49-F238E27FC236}">
+                <a16:creationId xmlns:a16="http://schemas.microsoft.com/office/drawing/2014/main" id="{4118C5A5-C47B-4E4C-A7BE-8532E2CDE565}"/>
+              </a:ext>
+            </a:extLst>
+          </p:cNvPr>
+          <p:cNvSpPr>
+            <a:spLocks noGrp="1"/>
+          </p:cNvSpPr>
+          <p:nvPr>
+            <p:ph type="sldNum" idx="12"/>
+          </p:nvPr>
+        </p:nvSpPr>
+        <p:spPr/>
+        <p:txBody>
+          <a:bodyPr/>
+          <a:lstStyle/>
+          <a:p>
+            <a:pPr marL="0" lvl="0" indent="0" algn="ctr" rtl="0">
+              <a:spcBef>
+                <a:spcPts val="0"/>
+              </a:spcBef>
+              <a:spcAft>
+                <a:spcPts val="0"/>
+              </a:spcAft>
+              <a:buNone/>
+            </a:pPr>
+            <a:fld id="{00000000-1234-1234-1234-123412341234}" type="slidenum">
+              <a:rPr lang="en-US" smtClean="0"/>
+              <a:t>3</a:t>
+            </a:fld>
+            <a:endParaRPr lang="en-US"/>
+          </a:p>
+        </p:txBody>
+      </p:sp>
+      <p:pic>
+        <p:nvPicPr>
+          <p:cNvPr id="6" name="Picture 5">
+            <a:extLst>
+              <a:ext uri="{FF2B5EF4-FFF2-40B4-BE49-F238E27FC236}">
+                <a16:creationId xmlns:a16="http://schemas.microsoft.com/office/drawing/2014/main" id="{11792A82-DC65-2944-9A10-D56161E8E5FD}"/>
+              </a:ext>
+            </a:extLst>
+          </p:cNvPr>
+          <p:cNvPicPr>
+            <a:picLocks noChangeAspect="1"/>
+          </p:cNvPicPr>
+          <p:nvPr/>
+        </p:nvPicPr>
+        <p:blipFill>
+          <a:blip r:embed="rId2">
+            <a:extLst>
+              <a:ext uri="{BEBA8EAE-BF5A-486C-A8C5-ECC9F3942E4B}">
+                <a14:imgProps xmlns:a14="http://schemas.microsoft.com/office/drawing/2010/main">
+                  <a14:imgLayer r:embed="rId3">
+                    <a14:imgEffect>
+                      <a14:backgroundRemoval t="2500" b="91563" l="7073" r="96341">
+                        <a14:foregroundMark x1="29512" y1="13906" x2="19634" y2="17500"/>
+                        <a14:foregroundMark x1="19634" y1="17500" x2="27317" y2="24063"/>
+                        <a14:foregroundMark x1="27317" y1="24063" x2="29146" y2="14375"/>
+                        <a14:foregroundMark x1="45366" y1="6719" x2="45000" y2="7500"/>
+                        <a14:foregroundMark x1="64634" y1="14375" x2="55000" y2="15156"/>
+                        <a14:foregroundMark x1="55000" y1="15156" x2="56585" y2="29375"/>
+                        <a14:foregroundMark x1="56585" y1="29375" x2="67073" y2="25625"/>
+                        <a14:foregroundMark x1="67073" y1="25625" x2="63537" y2="14844"/>
+                        <a14:foregroundMark x1="63537" y1="14844" x2="63171" y2="14844"/>
+                        <a14:foregroundMark x1="40366" y1="28281" x2="40366" y2="26875"/>
+                        <a14:foregroundMark x1="37561" y1="25156" x2="38659" y2="36875"/>
+                        <a14:foregroundMark x1="38659" y1="36875" x2="39390" y2="26094"/>
+                        <a14:foregroundMark x1="35488" y1="29219" x2="40366" y2="38125"/>
+                        <a14:foregroundMark x1="41463" y1="3906" x2="42195" y2="2656"/>
+                        <a14:foregroundMark x1="69146" y1="41250" x2="78415" y2="40469"/>
+                        <a14:foregroundMark x1="78415" y1="40469" x2="71829" y2="48906"/>
+                        <a14:foregroundMark x1="71829" y1="48906" x2="71951" y2="43125"/>
+                        <a14:foregroundMark x1="80488" y1="27813" x2="86341" y2="17344"/>
+                        <a14:foregroundMark x1="86341" y1="17344" x2="85000" y2="26875"/>
+                        <a14:foregroundMark x1="96585" y1="47188" x2="96585" y2="46250"/>
+                        <a14:foregroundMark x1="96220" y1="48906" x2="88537" y2="42344"/>
+                        <a14:foregroundMark x1="88537" y1="42344" x2="95488" y2="45781"/>
+                        <a14:foregroundMark x1="82561" y1="58438" x2="81829" y2="59844"/>
+                        <a14:foregroundMark x1="80122" y1="62969" x2="81098" y2="63750"/>
+                        <a14:foregroundMark x1="81098" y1="69688" x2="79390" y2="60156"/>
+                        <a14:foregroundMark x1="84634" y1="68281" x2="76951" y2="61875"/>
+                        <a14:foregroundMark x1="76951" y1="61875" x2="79390" y2="57969"/>
+                        <a14:foregroundMark x1="55488" y1="90313" x2="45854" y2="91563"/>
+                        <a14:foregroundMark x1="45854" y1="91563" x2="44634" y2="90781"/>
+                        <a14:foregroundMark x1="21098" y1="71406" x2="23171" y2="70156"/>
+                        <a14:foregroundMark x1="27073" y1="46719" x2="28780" y2="45781"/>
+                        <a14:foregroundMark x1="12683" y1="41719" x2="12683" y2="41250"/>
+                        <a14:foregroundMark x1="12317" y1="45313" x2="7073" y2="41719"/>
+                        <a14:foregroundMark x1="21098" y1="64219" x2="23537" y2="65625"/>
+                      </a14:backgroundRemoval>
+                    </a14:imgEffect>
+                  </a14:imgLayer>
+                </a14:imgProps>
+              </a:ext>
+            </a:extLst>
+          </a:blip>
+          <a:stretch>
+            <a:fillRect/>
+          </a:stretch>
+        </p:blipFill>
+        <p:spPr>
+          <a:xfrm>
+            <a:off x="6658703" y="2541492"/>
+            <a:ext cx="4895310" cy="3820730"/>
+          </a:xfrm>
+          <a:prstGeom prst="rect">
+            <a:avLst/>
+          </a:prstGeom>
+          <a:effectLst>
+            <a:outerShdw blurRad="76200" dir="13500000" sy="23000" kx="1200000" algn="br" rotWithShape="0">
+              <a:prstClr val="black">
+                <a:alpha val="20000"/>
+              </a:prstClr>
+            </a:outerShdw>
+          </a:effectLst>
+        </p:spPr>
+      </p:pic>
+    </p:spTree>
+    <p:extLst>
+      <p:ext uri="{BB962C8B-B14F-4D97-AF65-F5344CB8AC3E}">
+        <p14:creationId xmlns:p14="http://schemas.microsoft.com/office/powerpoint/2010/main" val="3369517740"/>
+      </p:ext>
+    </p:extLst>
+  </p:cSld>
+  <p:clrMapOvr>
+    <a:masterClrMapping/>
+  </p:clrMapOvr>
+</p:sld>
+</file>
+
+<file path=ppt/slides/slide4.xml><?xml version="1.0" encoding="utf-8"?>
+<p:sld xmlns:a="http://schemas.openxmlformats.org/drawingml/2006/main" xmlns:r="http://schemas.openxmlformats.org/officeDocument/2006/relationships" xmlns:p="http://schemas.openxmlformats.org/presentationml/2006/main">
+  <p:cSld>
+    <p:spTree>
+      <p:nvGrpSpPr>
+        <p:cNvPr id="1" name=""/>
+        <p:cNvGrpSpPr/>
+        <p:nvPr/>
+      </p:nvGrpSpPr>
+      <p:grpSpPr>
+        <a:xfrm>
+          <a:off x="0" y="0"/>
+          <a:ext cx="0" cy="0"/>
+          <a:chOff x="0" y="0"/>
+          <a:chExt cx="0" cy="0"/>
+        </a:xfrm>
+      </p:grpSpPr>
+      <p:sp>
+        <p:nvSpPr>
+          <p:cNvPr id="2" name="Title 1">
+            <a:extLst>
+              <a:ext uri="{FF2B5EF4-FFF2-40B4-BE49-F238E27FC236}">
                 <a16:creationId xmlns:a16="http://schemas.microsoft.com/office/drawing/2014/main" id="{B5C5C1FD-613D-1E40-8BFC-5EA8DEDE2150}"/>
               </a:ext>
             </a:extLst>
@@ -14856,7 +16413,7 @@
             </a:pPr>
             <a:fld id="{00000000-1234-1234-1234-123412341234}" type="slidenum">
               <a:rPr lang="en-US" smtClean="0"/>
-              <a:t>3</a:t>
+              <a:t>4</a:t>
             </a:fld>
             <a:endParaRPr lang="en-US"/>
           </a:p>
@@ -16247,304 +17804,6 @@
 </p:sld>
 </file>
 
-<file path=ppt/slides/slide4.xml><?xml version="1.0" encoding="utf-8"?>
-<p:sld xmlns:a="http://schemas.openxmlformats.org/drawingml/2006/main" xmlns:r="http://schemas.openxmlformats.org/officeDocument/2006/relationships" xmlns:p="http://schemas.openxmlformats.org/presentationml/2006/main">
-  <p:cSld>
-    <p:spTree>
-      <p:nvGrpSpPr>
-        <p:cNvPr id="1" name=""/>
-        <p:cNvGrpSpPr/>
-        <p:nvPr/>
-      </p:nvGrpSpPr>
-      <p:grpSpPr>
-        <a:xfrm>
-          <a:off x="0" y="0"/>
-          <a:ext cx="0" cy="0"/>
-          <a:chOff x="0" y="0"/>
-          <a:chExt cx="0" cy="0"/>
-        </a:xfrm>
-      </p:grpSpPr>
-      <p:pic>
-        <p:nvPicPr>
-          <p:cNvPr id="18" name="Picture 17" descr="A screenshot of a cell phone&#10;&#10;Description automatically generated">
-            <a:extLst>
-              <a:ext uri="{FF2B5EF4-FFF2-40B4-BE49-F238E27FC236}">
-                <a16:creationId xmlns:a16="http://schemas.microsoft.com/office/drawing/2014/main" id="{30B86FDD-5284-2349-B181-C2BAECFFD220}"/>
-              </a:ext>
-            </a:extLst>
-          </p:cNvPr>
-          <p:cNvPicPr>
-            <a:picLocks noChangeAspect="1"/>
-          </p:cNvPicPr>
-          <p:nvPr/>
-        </p:nvPicPr>
-        <p:blipFill>
-          <a:blip r:embed="rId3">
-            <a:grayscl/>
-            <a:extLst>
-              <a:ext uri="{28A0092B-C50C-407E-A947-70E740481C1C}">
-                <a14:useLocalDpi xmlns:a14="http://schemas.microsoft.com/office/drawing/2010/main" val="0"/>
-              </a:ext>
-            </a:extLst>
-          </a:blip>
-          <a:stretch>
-            <a:fillRect/>
-          </a:stretch>
-        </p:blipFill>
-        <p:spPr>
-          <a:xfrm>
-            <a:off x="8993700" y="2182761"/>
-            <a:ext cx="2905832" cy="2282313"/>
-          </a:xfrm>
-          <a:prstGeom prst="rect">
-            <a:avLst/>
-          </a:prstGeom>
-        </p:spPr>
-      </p:pic>
-      <p:sp>
-        <p:nvSpPr>
-          <p:cNvPr id="2" name="Title 1">
-            <a:extLst>
-              <a:ext uri="{FF2B5EF4-FFF2-40B4-BE49-F238E27FC236}">
-                <a16:creationId xmlns:a16="http://schemas.microsoft.com/office/drawing/2014/main" id="{45EC0157-B40C-AF46-B7A9-AA876817553D}"/>
-              </a:ext>
-            </a:extLst>
-          </p:cNvPr>
-          <p:cNvSpPr>
-            <a:spLocks noGrp="1"/>
-          </p:cNvSpPr>
-          <p:nvPr>
-            <p:ph type="title"/>
-          </p:nvPr>
-        </p:nvSpPr>
-        <p:spPr/>
-        <p:txBody>
-          <a:bodyPr/>
-          <a:lstStyle/>
-          <a:p>
-            <a:r>
-              <a:rPr lang="en-US" dirty="0"/>
-              <a:t>Efficient data storage in Snowflake</a:t>
-            </a:r>
-            <a:br>
-              <a:rPr lang="en-US" dirty="0"/>
-            </a:br>
-            <a:r>
-              <a:rPr lang="en-US" sz="2400" dirty="0"/>
-              <a:t>Database Storage Layer</a:t>
-            </a:r>
-          </a:p>
-        </p:txBody>
-      </p:sp>
-      <p:sp>
-        <p:nvSpPr>
-          <p:cNvPr id="4" name="Slide Number Placeholder 3">
-            <a:extLst>
-              <a:ext uri="{FF2B5EF4-FFF2-40B4-BE49-F238E27FC236}">
-                <a16:creationId xmlns:a16="http://schemas.microsoft.com/office/drawing/2014/main" id="{C4DFA311-D360-EF4C-A2A3-FF0BCA0792F1}"/>
-              </a:ext>
-            </a:extLst>
-          </p:cNvPr>
-          <p:cNvSpPr>
-            <a:spLocks noGrp="1"/>
-          </p:cNvSpPr>
-          <p:nvPr>
-            <p:ph type="sldNum" idx="12"/>
-          </p:nvPr>
-        </p:nvSpPr>
-        <p:spPr/>
-        <p:txBody>
-          <a:bodyPr/>
-          <a:lstStyle/>
-          <a:p>
-            <a:pPr marL="0" lvl="0" indent="0" algn="ctr" rtl="0">
-              <a:spcBef>
-                <a:spcPts val="0"/>
-              </a:spcBef>
-              <a:spcAft>
-                <a:spcPts val="0"/>
-              </a:spcAft>
-              <a:buNone/>
-            </a:pPr>
-            <a:fld id="{00000000-1234-1234-1234-123412341234}" type="slidenum">
-              <a:rPr lang="en-US" smtClean="0"/>
-              <a:t>4</a:t>
-            </a:fld>
-            <a:endParaRPr lang="en-US"/>
-          </a:p>
-        </p:txBody>
-      </p:sp>
-      <p:sp>
-        <p:nvSpPr>
-          <p:cNvPr id="9" name="Text Placeholder 8">
-            <a:extLst>
-              <a:ext uri="{FF2B5EF4-FFF2-40B4-BE49-F238E27FC236}">
-                <a16:creationId xmlns:a16="http://schemas.microsoft.com/office/drawing/2014/main" id="{DCCA0D9A-4A01-4C7A-9188-E2C3FC3F0709}"/>
-              </a:ext>
-            </a:extLst>
-          </p:cNvPr>
-          <p:cNvSpPr>
-            <a:spLocks noGrp="1"/>
-          </p:cNvSpPr>
-          <p:nvPr>
-            <p:ph type="body" idx="1"/>
-          </p:nvPr>
-        </p:nvSpPr>
-        <p:spPr>
-          <a:xfrm>
-            <a:off x="292468" y="1385162"/>
-            <a:ext cx="8507403" cy="5015638"/>
-          </a:xfrm>
-        </p:spPr>
-        <p:txBody>
-          <a:bodyPr/>
-          <a:lstStyle/>
-          <a:p>
-            <a:pPr>
-              <a:buFont typeface="Arial" panose="020B0604020202020204" pitchFamily="34" charset="0"/>
-              <a:buChar char="•"/>
-            </a:pPr>
-            <a:r>
-              <a:rPr lang="en-US" sz="2200" dirty="0"/>
-              <a:t>The storage layer contains tables, schemas, databases, and diverse data </a:t>
-            </a:r>
-          </a:p>
-          <a:p>
-            <a:pPr lvl="1">
-              <a:buFont typeface="Wingdings" pitchFamily="2" charset="2"/>
-              <a:buChar char="Ø"/>
-            </a:pPr>
-            <a:r>
-              <a:rPr lang="en-US" sz="2000" dirty="0"/>
-              <a:t>If managed well storage layer can hold petabytes of data</a:t>
-            </a:r>
-          </a:p>
-          <a:p>
-            <a:pPr>
-              <a:buFont typeface="Arial" panose="020B0604020202020204" pitchFamily="34" charset="0"/>
-              <a:buChar char="•"/>
-            </a:pPr>
-            <a:r>
-              <a:rPr lang="en-US" sz="2200" dirty="0"/>
-              <a:t>Snowflake has scalable cloud blob storage type for storing structured and semi-structured data </a:t>
-            </a:r>
-          </a:p>
-          <a:p>
-            <a:pPr lvl="1">
-              <a:buFont typeface="Wingdings" pitchFamily="2" charset="2"/>
-              <a:buChar char="Ø"/>
-            </a:pPr>
-            <a:r>
-              <a:rPr lang="en-US" sz="2000" dirty="0"/>
-              <a:t>Such as JSON, AVRO, and Parquet</a:t>
-            </a:r>
-          </a:p>
-          <a:p>
-            <a:pPr>
-              <a:buFont typeface="Arial" panose="020B0604020202020204" pitchFamily="34" charset="0"/>
-              <a:buChar char="•"/>
-            </a:pPr>
-            <a:r>
-              <a:rPr lang="en-US" sz="2200" dirty="0"/>
-              <a:t>Snowflake optimizes the metadata for easy extraction and query processing </a:t>
-            </a:r>
-          </a:p>
-          <a:p>
-            <a:pPr>
-              <a:buFont typeface="Arial" panose="020B0604020202020204" pitchFamily="34" charset="0"/>
-              <a:buChar char="•"/>
-            </a:pPr>
-            <a:r>
-              <a:rPr lang="en-US" sz="2200" dirty="0"/>
-              <a:t>Storage is made up of multiple micro partitions that are encrypted and scale automatically</a:t>
-            </a:r>
-          </a:p>
-          <a:p>
-            <a:pPr lvl="1">
-              <a:buFont typeface="Wingdings" pitchFamily="2" charset="2"/>
-              <a:buChar char="Ø"/>
-            </a:pPr>
-            <a:r>
-              <a:rPr lang="en-US" sz="2000" dirty="0"/>
-              <a:t>Allows for efficient data retrieval and performance</a:t>
-            </a:r>
-          </a:p>
-          <a:p>
-            <a:pPr>
-              <a:buFont typeface="Arial" panose="020B0604020202020204" pitchFamily="34" charset="0"/>
-              <a:buChar char="•"/>
-            </a:pPr>
-            <a:endParaRPr lang="en-US" sz="2200" dirty="0"/>
-          </a:p>
-          <a:p>
-            <a:endParaRPr lang="en-US" dirty="0"/>
-          </a:p>
-          <a:p>
-            <a:pPr marL="76200" indent="0">
-              <a:buNone/>
-            </a:pPr>
-            <a:endParaRPr lang="en-US" dirty="0"/>
-          </a:p>
-        </p:txBody>
-      </p:sp>
-      <p:pic>
-        <p:nvPicPr>
-          <p:cNvPr id="16" name="Picture 15" descr="A picture containing cup, indoor, table, sitting&#10;&#10;Description automatically generated">
-            <a:extLst>
-              <a:ext uri="{FF2B5EF4-FFF2-40B4-BE49-F238E27FC236}">
-                <a16:creationId xmlns:a16="http://schemas.microsoft.com/office/drawing/2014/main" id="{D35B3FF5-64CB-F14A-82C3-666E47C27AC8}"/>
-              </a:ext>
-            </a:extLst>
-          </p:cNvPr>
-          <p:cNvPicPr>
-            <a:picLocks noChangeAspect="1"/>
-          </p:cNvPicPr>
-          <p:nvPr/>
-        </p:nvPicPr>
-        <p:blipFill>
-          <a:blip r:embed="rId4">
-            <a:extLst>
-              <a:ext uri="{BEBA8EAE-BF5A-486C-A8C5-ECC9F3942E4B}">
-                <a14:imgProps xmlns:a14="http://schemas.microsoft.com/office/drawing/2010/main">
-                  <a14:imgLayer r:embed="rId5">
-                    <a14:imgEffect>
-                      <a14:colorTemperature colorTemp="4700"/>
-                    </a14:imgEffect>
-                  </a14:imgLayer>
-                </a14:imgProps>
-              </a:ext>
-              <a:ext uri="{28A0092B-C50C-407E-A947-70E740481C1C}">
-                <a14:useLocalDpi xmlns:a14="http://schemas.microsoft.com/office/drawing/2010/main" val="0"/>
-              </a:ext>
-            </a:extLst>
-          </a:blip>
-          <a:stretch>
-            <a:fillRect/>
-          </a:stretch>
-        </p:blipFill>
-        <p:spPr>
-          <a:xfrm>
-            <a:off x="8993700" y="3725162"/>
-            <a:ext cx="2900926" cy="739912"/>
-          </a:xfrm>
-          <a:prstGeom prst="rect">
-            <a:avLst/>
-          </a:prstGeom>
-        </p:spPr>
-      </p:pic>
-    </p:spTree>
-    <p:extLst>
-      <p:ext uri="{BB962C8B-B14F-4D97-AF65-F5344CB8AC3E}">
-        <p14:creationId xmlns:p14="http://schemas.microsoft.com/office/powerpoint/2010/main" val="3674256296"/>
-      </p:ext>
-    </p:extLst>
-  </p:cSld>
-  <p:clrMapOvr>
-    <a:masterClrMapping/>
-  </p:clrMapOvr>
-</p:sld>
-</file>
-
 <file path=ppt/slides/slide5.xml><?xml version="1.0" encoding="utf-8"?>
 <p:sld xmlns:a="http://schemas.openxmlformats.org/drawingml/2006/main" xmlns:r="http://schemas.openxmlformats.org/officeDocument/2006/relationships" xmlns:p="http://schemas.openxmlformats.org/presentationml/2006/main">
   <p:cSld>
@@ -16629,9 +17888,8 @@
             </a:br>
             <a:r>
               <a:rPr lang="en-US" sz="2400" dirty="0"/>
-              <a:t>Query Processing Layer</a:t>
-            </a:r>
-            <a:endParaRPr lang="en-US" dirty="0"/>
+              <a:t>Database Storage Layer</a:t>
+            </a:r>
           </a:p>
         </p:txBody>
       </p:sp>
@@ -16705,7 +17963,7 @@
             </a:pPr>
             <a:r>
               <a:rPr lang="en-US" sz="2200" dirty="0"/>
-              <a:t>This layer contains virtual warehouses where all the queries are run on each respective virtual warehouse</a:t>
+              <a:t>The storage layer contains tables, schemas, databases, and diverse data </a:t>
             </a:r>
           </a:p>
           <a:p>
@@ -16715,7 +17973,17 @@
             </a:pPr>
             <a:r>
               <a:rPr lang="en-US" sz="2000" dirty="0"/>
-              <a:t>Allows for a scalable compute capacity</a:t>
+              <a:t>If managed well storage layer can hold petabytes of data</a:t>
+            </a:r>
+          </a:p>
+          <a:p>
+            <a:pPr>
+              <a:buFont typeface="Arial" panose="020B0604020202020204" pitchFamily="34" charset="0"/>
+              <a:buChar char="•"/>
+            </a:pPr>
+            <a:r>
+              <a:rPr lang="en-US" sz="2200" dirty="0"/>
+              <a:t>Snowflake has scalable cloud blob storage type for storing structured and semi-structured data </a:t>
             </a:r>
           </a:p>
           <a:p>
@@ -16725,7 +17993,7 @@
             </a:pPr>
             <a:r>
               <a:rPr lang="en-US" sz="2000" dirty="0"/>
-              <a:t>Each Virtual warehouse gets data from the storage layer and has it cached to the compute resources</a:t>
+              <a:t>Such as JSON, AVRO, and Parquet</a:t>
             </a:r>
           </a:p>
           <a:p>
@@ -16735,7 +18003,17 @@
             </a:pPr>
             <a:r>
               <a:rPr lang="en-US" sz="2200" dirty="0"/>
-              <a:t>Multiple VW operate simultaneously to maintain ACID and follow multiple parallel processing</a:t>
+              <a:t>Snowflake optimizes the metadata for easy extraction and query processing </a:t>
+            </a:r>
+          </a:p>
+          <a:p>
+            <a:pPr>
+              <a:buFont typeface="Arial" panose="020B0604020202020204" pitchFamily="34" charset="0"/>
+              <a:buChar char="•"/>
+            </a:pPr>
+            <a:r>
+              <a:rPr lang="en-US" sz="2200" dirty="0"/>
+              <a:t>Storage is made up of multiple micro partitions that are encrypted and scale automatically</a:t>
             </a:r>
           </a:p>
           <a:p>
@@ -16745,7 +18023,7 @@
             </a:pPr>
             <a:r>
               <a:rPr lang="en-US" sz="2000" dirty="0"/>
-              <a:t>ACID (Atomic, Consistent, Isolated and Durable) that ensure a database management system (DBMS) will make changes to data in a reliable</a:t>
+              <a:t>Allows for efficient data retrieval and performance</a:t>
             </a:r>
           </a:p>
           <a:p>
@@ -16753,15 +18031,6 @@
               <a:buFont typeface="Arial" panose="020B0604020202020204" pitchFamily="34" charset="0"/>
               <a:buChar char="•"/>
             </a:pPr>
-            <a:r>
-              <a:rPr lang="en-US" sz="2200" dirty="0"/>
-              <a:t>VW can auto-suspend, auto-resume, and have auto-scaling that can be built in </a:t>
-            </a:r>
-          </a:p>
-          <a:p>
-            <a:pPr marL="76200" indent="0">
-              <a:buNone/>
-            </a:pPr>
             <a:endParaRPr lang="en-US" sz="2200" dirty="0"/>
           </a:p>
           <a:p>
@@ -16777,10 +18046,10 @@
       </p:sp>
       <p:pic>
         <p:nvPicPr>
-          <p:cNvPr id="5" name="Picture 4" descr="A picture containing yellow&#10;&#10;Description automatically generated">
+          <p:cNvPr id="16" name="Picture 15" descr="A picture containing cup, indoor, table, sitting&#10;&#10;Description automatically generated">
             <a:extLst>
               <a:ext uri="{FF2B5EF4-FFF2-40B4-BE49-F238E27FC236}">
-                <a16:creationId xmlns:a16="http://schemas.microsoft.com/office/drawing/2014/main" id="{C1F6BB2F-652B-D149-A732-13C50AFDF562}"/>
+                <a16:creationId xmlns:a16="http://schemas.microsoft.com/office/drawing/2014/main" id="{D35B3FF5-64CB-F14A-82C3-666E47C27AC8}"/>
               </a:ext>
             </a:extLst>
           </p:cNvPr>
@@ -16812,8 +18081,8 @@
         </p:blipFill>
         <p:spPr>
           <a:xfrm>
-            <a:off x="8993700" y="2943960"/>
-            <a:ext cx="2905832" cy="741164"/>
+            <a:off x="8993700" y="3725162"/>
+            <a:ext cx="2900926" cy="739912"/>
           </a:xfrm>
           <a:prstGeom prst="rect">
             <a:avLst/>
@@ -16823,7 +18092,7 @@
     </p:spTree>
     <p:extLst>
       <p:ext uri="{BB962C8B-B14F-4D97-AF65-F5344CB8AC3E}">
-        <p14:creationId xmlns:p14="http://schemas.microsoft.com/office/powerpoint/2010/main" val="2447226174"/>
+        <p14:creationId xmlns:p14="http://schemas.microsoft.com/office/powerpoint/2010/main" val="3674256296"/>
       </p:ext>
     </p:extLst>
   </p:cSld>
@@ -16910,14 +18179,14 @@
           <a:p>
             <a:r>
               <a:rPr lang="en-US" dirty="0"/>
-              <a:t>Efficient data storage in Snowflake</a:t>
+              <a:t>Efficient Query Processing in Snowflake</a:t>
             </a:r>
             <a:br>
               <a:rPr lang="en-US" dirty="0"/>
             </a:br>
             <a:r>
               <a:rPr lang="en-US" sz="2400" dirty="0"/>
-              <a:t>Cloud Services Layer</a:t>
+              <a:t>Query Processing Layer</a:t>
             </a:r>
             <a:endParaRPr lang="en-US" dirty="0"/>
           </a:p>
@@ -16956,6 +18225,294 @@
             <a:fld id="{00000000-1234-1234-1234-123412341234}" type="slidenum">
               <a:rPr lang="en-US" smtClean="0"/>
               <a:t>6</a:t>
+            </a:fld>
+            <a:endParaRPr lang="en-US"/>
+          </a:p>
+        </p:txBody>
+      </p:sp>
+      <p:sp>
+        <p:nvSpPr>
+          <p:cNvPr id="9" name="Text Placeholder 8">
+            <a:extLst>
+              <a:ext uri="{FF2B5EF4-FFF2-40B4-BE49-F238E27FC236}">
+                <a16:creationId xmlns:a16="http://schemas.microsoft.com/office/drawing/2014/main" id="{DCCA0D9A-4A01-4C7A-9188-E2C3FC3F0709}"/>
+              </a:ext>
+            </a:extLst>
+          </p:cNvPr>
+          <p:cNvSpPr>
+            <a:spLocks noGrp="1"/>
+          </p:cNvSpPr>
+          <p:nvPr>
+            <p:ph type="body" idx="1"/>
+          </p:nvPr>
+        </p:nvSpPr>
+        <p:spPr>
+          <a:xfrm>
+            <a:off x="292468" y="1385162"/>
+            <a:ext cx="8507403" cy="5015638"/>
+          </a:xfrm>
+        </p:spPr>
+        <p:txBody>
+          <a:bodyPr/>
+          <a:lstStyle/>
+          <a:p>
+            <a:pPr>
+              <a:buFont typeface="Arial" panose="020B0604020202020204" pitchFamily="34" charset="0"/>
+              <a:buChar char="•"/>
+            </a:pPr>
+            <a:r>
+              <a:rPr lang="en-US" sz="2200" dirty="0"/>
+              <a:t>This layer contains virtual warehouses where all the queries are run on each respective virtual warehouse</a:t>
+            </a:r>
+          </a:p>
+          <a:p>
+            <a:pPr lvl="1">
+              <a:buFont typeface="Wingdings" pitchFamily="2" charset="2"/>
+              <a:buChar char="Ø"/>
+            </a:pPr>
+            <a:r>
+              <a:rPr lang="en-US" sz="2000" dirty="0"/>
+              <a:t>Allows for a scalable compute capacity</a:t>
+            </a:r>
+          </a:p>
+          <a:p>
+            <a:pPr lvl="1">
+              <a:buFont typeface="Wingdings" pitchFamily="2" charset="2"/>
+              <a:buChar char="Ø"/>
+            </a:pPr>
+            <a:r>
+              <a:rPr lang="en-US" sz="2000" dirty="0"/>
+              <a:t>Each Virtual warehouse gets data from the storage layer and has it cached to the compute resources</a:t>
+            </a:r>
+          </a:p>
+          <a:p>
+            <a:pPr>
+              <a:buFont typeface="Arial" panose="020B0604020202020204" pitchFamily="34" charset="0"/>
+              <a:buChar char="•"/>
+            </a:pPr>
+            <a:r>
+              <a:rPr lang="en-US" sz="2200" dirty="0"/>
+              <a:t>Multiple VW operate simultaneously to maintain ACID and follow multiple parallel processing</a:t>
+            </a:r>
+          </a:p>
+          <a:p>
+            <a:pPr lvl="1">
+              <a:buFont typeface="Wingdings" pitchFamily="2" charset="2"/>
+              <a:buChar char="Ø"/>
+            </a:pPr>
+            <a:r>
+              <a:rPr lang="en-US" sz="2000" dirty="0"/>
+              <a:t>ACID (Atomic, Consistent, Isolated and Durable) that ensure a database management system (DBMS) will make changes to data in a reliable</a:t>
+            </a:r>
+          </a:p>
+          <a:p>
+            <a:pPr>
+              <a:buFont typeface="Arial" panose="020B0604020202020204" pitchFamily="34" charset="0"/>
+              <a:buChar char="•"/>
+            </a:pPr>
+            <a:r>
+              <a:rPr lang="en-US" sz="2200" dirty="0"/>
+              <a:t>VW can auto-suspend, auto-resume, and have auto-scaling that can be built in </a:t>
+            </a:r>
+          </a:p>
+          <a:p>
+            <a:pPr marL="76200" indent="0">
+              <a:buNone/>
+            </a:pPr>
+            <a:endParaRPr lang="en-US" sz="2200" dirty="0"/>
+          </a:p>
+          <a:p>
+            <a:endParaRPr lang="en-US" dirty="0"/>
+          </a:p>
+          <a:p>
+            <a:pPr marL="76200" indent="0">
+              <a:buNone/>
+            </a:pPr>
+            <a:endParaRPr lang="en-US" dirty="0"/>
+          </a:p>
+        </p:txBody>
+      </p:sp>
+      <p:pic>
+        <p:nvPicPr>
+          <p:cNvPr id="5" name="Picture 4" descr="A picture containing yellow&#10;&#10;Description automatically generated">
+            <a:extLst>
+              <a:ext uri="{FF2B5EF4-FFF2-40B4-BE49-F238E27FC236}">
+                <a16:creationId xmlns:a16="http://schemas.microsoft.com/office/drawing/2014/main" id="{C1F6BB2F-652B-D149-A732-13C50AFDF562}"/>
+              </a:ext>
+            </a:extLst>
+          </p:cNvPr>
+          <p:cNvPicPr>
+            <a:picLocks noChangeAspect="1"/>
+          </p:cNvPicPr>
+          <p:nvPr/>
+        </p:nvPicPr>
+        <p:blipFill>
+          <a:blip r:embed="rId4">
+            <a:extLst>
+              <a:ext uri="{BEBA8EAE-BF5A-486C-A8C5-ECC9F3942E4B}">
+                <a14:imgProps xmlns:a14="http://schemas.microsoft.com/office/drawing/2010/main">
+                  <a14:imgLayer r:embed="rId5">
+                    <a14:imgEffect>
+                      <a14:colorTemperature colorTemp="4700"/>
+                    </a14:imgEffect>
+                  </a14:imgLayer>
+                </a14:imgProps>
+              </a:ext>
+              <a:ext uri="{28A0092B-C50C-407E-A947-70E740481C1C}">
+                <a14:useLocalDpi xmlns:a14="http://schemas.microsoft.com/office/drawing/2010/main" val="0"/>
+              </a:ext>
+            </a:extLst>
+          </a:blip>
+          <a:stretch>
+            <a:fillRect/>
+          </a:stretch>
+        </p:blipFill>
+        <p:spPr>
+          <a:xfrm>
+            <a:off x="8993700" y="2943960"/>
+            <a:ext cx="2905832" cy="741164"/>
+          </a:xfrm>
+          <a:prstGeom prst="rect">
+            <a:avLst/>
+          </a:prstGeom>
+        </p:spPr>
+      </p:pic>
+    </p:spTree>
+    <p:extLst>
+      <p:ext uri="{BB962C8B-B14F-4D97-AF65-F5344CB8AC3E}">
+        <p14:creationId xmlns:p14="http://schemas.microsoft.com/office/powerpoint/2010/main" val="2447226174"/>
+      </p:ext>
+    </p:extLst>
+  </p:cSld>
+  <p:clrMapOvr>
+    <a:masterClrMapping/>
+  </p:clrMapOvr>
+</p:sld>
+</file>
+
+<file path=ppt/slides/slide7.xml><?xml version="1.0" encoding="utf-8"?>
+<p:sld xmlns:a="http://schemas.openxmlformats.org/drawingml/2006/main" xmlns:r="http://schemas.openxmlformats.org/officeDocument/2006/relationships" xmlns:p="http://schemas.openxmlformats.org/presentationml/2006/main">
+  <p:cSld>
+    <p:spTree>
+      <p:nvGrpSpPr>
+        <p:cNvPr id="1" name=""/>
+        <p:cNvGrpSpPr/>
+        <p:nvPr/>
+      </p:nvGrpSpPr>
+      <p:grpSpPr>
+        <a:xfrm>
+          <a:off x="0" y="0"/>
+          <a:ext cx="0" cy="0"/>
+          <a:chOff x="0" y="0"/>
+          <a:chExt cx="0" cy="0"/>
+        </a:xfrm>
+      </p:grpSpPr>
+      <p:pic>
+        <p:nvPicPr>
+          <p:cNvPr id="18" name="Picture 17" descr="A screenshot of a cell phone&#10;&#10;Description automatically generated">
+            <a:extLst>
+              <a:ext uri="{FF2B5EF4-FFF2-40B4-BE49-F238E27FC236}">
+                <a16:creationId xmlns:a16="http://schemas.microsoft.com/office/drawing/2014/main" id="{30B86FDD-5284-2349-B181-C2BAECFFD220}"/>
+              </a:ext>
+            </a:extLst>
+          </p:cNvPr>
+          <p:cNvPicPr>
+            <a:picLocks noChangeAspect="1"/>
+          </p:cNvPicPr>
+          <p:nvPr/>
+        </p:nvPicPr>
+        <p:blipFill>
+          <a:blip r:embed="rId3">
+            <a:grayscl/>
+            <a:extLst>
+              <a:ext uri="{28A0092B-C50C-407E-A947-70E740481C1C}">
+                <a14:useLocalDpi xmlns:a14="http://schemas.microsoft.com/office/drawing/2010/main" val="0"/>
+              </a:ext>
+            </a:extLst>
+          </a:blip>
+          <a:stretch>
+            <a:fillRect/>
+          </a:stretch>
+        </p:blipFill>
+        <p:spPr>
+          <a:xfrm>
+            <a:off x="8993700" y="2182761"/>
+            <a:ext cx="2905832" cy="2282313"/>
+          </a:xfrm>
+          <a:prstGeom prst="rect">
+            <a:avLst/>
+          </a:prstGeom>
+        </p:spPr>
+      </p:pic>
+      <p:sp>
+        <p:nvSpPr>
+          <p:cNvPr id="2" name="Title 1">
+            <a:extLst>
+              <a:ext uri="{FF2B5EF4-FFF2-40B4-BE49-F238E27FC236}">
+                <a16:creationId xmlns:a16="http://schemas.microsoft.com/office/drawing/2014/main" id="{45EC0157-B40C-AF46-B7A9-AA876817553D}"/>
+              </a:ext>
+            </a:extLst>
+          </p:cNvPr>
+          <p:cNvSpPr>
+            <a:spLocks noGrp="1"/>
+          </p:cNvSpPr>
+          <p:nvPr>
+            <p:ph type="title"/>
+          </p:nvPr>
+        </p:nvSpPr>
+        <p:spPr/>
+        <p:txBody>
+          <a:bodyPr/>
+          <a:lstStyle/>
+          <a:p>
+            <a:r>
+              <a:rPr lang="en-US" dirty="0"/>
+              <a:t>Efficient Cloud Storage in Snowflake</a:t>
+            </a:r>
+            <a:br>
+              <a:rPr lang="en-US" dirty="0"/>
+            </a:br>
+            <a:r>
+              <a:rPr lang="en-US" sz="2400" dirty="0"/>
+              <a:t>Cloud Services Layer</a:t>
+            </a:r>
+            <a:endParaRPr lang="en-US" dirty="0"/>
+          </a:p>
+        </p:txBody>
+      </p:sp>
+      <p:sp>
+        <p:nvSpPr>
+          <p:cNvPr id="4" name="Slide Number Placeholder 3">
+            <a:extLst>
+              <a:ext uri="{FF2B5EF4-FFF2-40B4-BE49-F238E27FC236}">
+                <a16:creationId xmlns:a16="http://schemas.microsoft.com/office/drawing/2014/main" id="{C4DFA311-D360-EF4C-A2A3-FF0BCA0792F1}"/>
+              </a:ext>
+            </a:extLst>
+          </p:cNvPr>
+          <p:cNvSpPr>
+            <a:spLocks noGrp="1"/>
+          </p:cNvSpPr>
+          <p:nvPr>
+            <p:ph type="sldNum" idx="12"/>
+          </p:nvPr>
+        </p:nvSpPr>
+        <p:spPr/>
+        <p:txBody>
+          <a:bodyPr/>
+          <a:lstStyle/>
+          <a:p>
+            <a:pPr marL="0" lvl="0" indent="0" algn="ctr" rtl="0">
+              <a:spcBef>
+                <a:spcPts val="0"/>
+              </a:spcBef>
+              <a:spcAft>
+                <a:spcPts val="0"/>
+              </a:spcAft>
+              <a:buNone/>
+            </a:pPr>
+            <a:fld id="{00000000-1234-1234-1234-123412341234}" type="slidenum">
+              <a:rPr lang="en-US" smtClean="0"/>
+              <a:t>7</a:t>
             </a:fld>
             <a:endParaRPr lang="en-US"/>
           </a:p>
@@ -17091,7 +18648,7 @@
 </p:sld>
 </file>
 
-<file path=ppt/slides/slide7.xml><?xml version="1.0" encoding="utf-8"?>
+<file path=ppt/slides/slide8.xml><?xml version="1.0" encoding="utf-8"?>
 <p:sld xmlns:a="http://schemas.openxmlformats.org/drawingml/2006/main" xmlns:r="http://schemas.openxmlformats.org/officeDocument/2006/relationships" xmlns:p="http://schemas.openxmlformats.org/presentationml/2006/main">
   <p:cSld>
     <p:spTree>
@@ -17168,7 +18725,7 @@
             </a:pPr>
             <a:fld id="{00000000-1234-1234-1234-123412341234}" type="slidenum">
               <a:rPr lang="en-US" smtClean="0"/>
-              <a:t>7</a:t>
+              <a:t>8</a:t>
             </a:fld>
             <a:endParaRPr lang="en-US"/>
           </a:p>
@@ -17350,7 +18907,7 @@
 </p:sld>
 </file>
 
-<file path=ppt/slides/slide8.xml><?xml version="1.0" encoding="utf-8"?>
+<file path=ppt/slides/slide9.xml><?xml version="1.0" encoding="utf-8"?>
 <p:sld xmlns:a="http://schemas.openxmlformats.org/drawingml/2006/main" xmlns:r="http://schemas.openxmlformats.org/officeDocument/2006/relationships" xmlns:p="http://schemas.openxmlformats.org/presentationml/2006/main">
   <p:cSld>
     <p:spTree>
@@ -17427,7 +18984,7 @@
             </a:pPr>
             <a:fld id="{00000000-1234-1234-1234-123412341234}" type="slidenum">
               <a:rPr lang="en-US" smtClean="0"/>
-              <a:t>8</a:t>
+              <a:t>9</a:t>
             </a:fld>
             <a:endParaRPr lang="en-US"/>
           </a:p>
@@ -17953,1268 +19510,6 @@
     <p:extLst>
       <p:ext uri="{BB962C8B-B14F-4D97-AF65-F5344CB8AC3E}">
         <p14:creationId xmlns:p14="http://schemas.microsoft.com/office/powerpoint/2010/main" val="2945034092"/>
-      </p:ext>
-    </p:extLst>
-  </p:cSld>
-  <p:clrMapOvr>
-    <a:masterClrMapping/>
-  </p:clrMapOvr>
-</p:sld>
-</file>
-
-<file path=ppt/slides/slide9.xml><?xml version="1.0" encoding="utf-8"?>
-<p:sld xmlns:a="http://schemas.openxmlformats.org/drawingml/2006/main" xmlns:r="http://schemas.openxmlformats.org/officeDocument/2006/relationships" xmlns:p="http://schemas.openxmlformats.org/presentationml/2006/main">
-  <p:cSld>
-    <p:spTree>
-      <p:nvGrpSpPr>
-        <p:cNvPr id="1" name=""/>
-        <p:cNvGrpSpPr/>
-        <p:nvPr/>
-      </p:nvGrpSpPr>
-      <p:grpSpPr>
-        <a:xfrm>
-          <a:off x="0" y="0"/>
-          <a:ext cx="0" cy="0"/>
-          <a:chOff x="0" y="0"/>
-          <a:chExt cx="0" cy="0"/>
-        </a:xfrm>
-      </p:grpSpPr>
-      <p:pic>
-        <p:nvPicPr>
-          <p:cNvPr id="5" name="Picture 4">
-            <a:extLst>
-              <a:ext uri="{FF2B5EF4-FFF2-40B4-BE49-F238E27FC236}">
-                <a16:creationId xmlns:a16="http://schemas.microsoft.com/office/drawing/2014/main" id="{AD826950-8BF2-1541-A331-35775917C857}"/>
-              </a:ext>
-            </a:extLst>
-          </p:cNvPr>
-          <p:cNvPicPr>
-            <a:picLocks noChangeAspect="1"/>
-          </p:cNvPicPr>
-          <p:nvPr/>
-        </p:nvPicPr>
-        <p:blipFill>
-          <a:blip r:embed="rId3">
-            <a:extLst>
-              <a:ext uri="{BEBA8EAE-BF5A-486C-A8C5-ECC9F3942E4B}">
-                <a14:imgProps xmlns:a14="http://schemas.microsoft.com/office/drawing/2010/main">
-                  <a14:imgLayer r:embed="rId4">
-                    <a14:imgEffect>
-                      <a14:backgroundRemoval t="7477" b="89720" l="9787" r="89787">
-                        <a14:foregroundMark x1="56596" y1="11215" x2="56596" y2="11215"/>
-                        <a14:foregroundMark x1="55745" y1="7477" x2="52340" y2="9346"/>
-                        <a14:foregroundMark x1="58298" y1="56075" x2="54894" y2="53271"/>
-                      </a14:backgroundRemoval>
-                    </a14:imgEffect>
-                  </a14:imgLayer>
-                </a14:imgProps>
-              </a:ext>
-            </a:extLst>
-          </a:blip>
-          <a:stretch>
-            <a:fillRect/>
-          </a:stretch>
-        </p:blipFill>
-        <p:spPr>
-          <a:xfrm flipH="1">
-            <a:off x="-88385" y="5197695"/>
-            <a:ext cx="1512121" cy="1358900"/>
-          </a:xfrm>
-          <a:prstGeom prst="rect">
-            <a:avLst/>
-          </a:prstGeom>
-        </p:spPr>
-      </p:pic>
-      <p:sp>
-        <p:nvSpPr>
-          <p:cNvPr id="2" name="Title 1">
-            <a:extLst>
-              <a:ext uri="{FF2B5EF4-FFF2-40B4-BE49-F238E27FC236}">
-                <a16:creationId xmlns:a16="http://schemas.microsoft.com/office/drawing/2014/main" id="{45EC0157-B40C-AF46-B7A9-AA876817553D}"/>
-              </a:ext>
-            </a:extLst>
-          </p:cNvPr>
-          <p:cNvSpPr>
-            <a:spLocks noGrp="1"/>
-          </p:cNvSpPr>
-          <p:nvPr>
-            <p:ph type="title"/>
-          </p:nvPr>
-        </p:nvSpPr>
-        <p:spPr/>
-        <p:txBody>
-          <a:bodyPr/>
-          <a:lstStyle/>
-          <a:p>
-            <a:r>
-              <a:rPr lang="en-US"/>
-              <a:t>Query Pruning</a:t>
-            </a:r>
-          </a:p>
-        </p:txBody>
-      </p:sp>
-      <p:sp>
-        <p:nvSpPr>
-          <p:cNvPr id="4" name="Slide Number Placeholder 3">
-            <a:extLst>
-              <a:ext uri="{FF2B5EF4-FFF2-40B4-BE49-F238E27FC236}">
-                <a16:creationId xmlns:a16="http://schemas.microsoft.com/office/drawing/2014/main" id="{C4DFA311-D360-EF4C-A2A3-FF0BCA0792F1}"/>
-              </a:ext>
-            </a:extLst>
-          </p:cNvPr>
-          <p:cNvSpPr>
-            <a:spLocks noGrp="1"/>
-          </p:cNvSpPr>
-          <p:nvPr>
-            <p:ph type="sldNum" idx="12"/>
-          </p:nvPr>
-        </p:nvSpPr>
-        <p:spPr>
-          <a:xfrm>
-            <a:off x="11340000" y="6599097"/>
-            <a:ext cx="834067" cy="298455"/>
-          </a:xfrm>
-        </p:spPr>
-        <p:txBody>
-          <a:bodyPr/>
-          <a:lstStyle/>
-          <a:p>
-            <a:pPr marL="0" lvl="0" indent="0" algn="ctr" rtl="0">
-              <a:spcBef>
-                <a:spcPts val="0"/>
-              </a:spcBef>
-              <a:spcAft>
-                <a:spcPts val="0"/>
-              </a:spcAft>
-              <a:buNone/>
-            </a:pPr>
-            <a:fld id="{00000000-1234-1234-1234-123412341234}" type="slidenum">
-              <a:rPr lang="en-US" smtClean="0"/>
-              <a:t>9</a:t>
-            </a:fld>
-            <a:endParaRPr lang="en-US" dirty="0"/>
-          </a:p>
-        </p:txBody>
-      </p:sp>
-      <p:sp>
-        <p:nvSpPr>
-          <p:cNvPr id="9" name="Text Placeholder 8">
-            <a:extLst>
-              <a:ext uri="{FF2B5EF4-FFF2-40B4-BE49-F238E27FC236}">
-                <a16:creationId xmlns:a16="http://schemas.microsoft.com/office/drawing/2014/main" id="{DCCA0D9A-4A01-4C7A-9188-E2C3FC3F0709}"/>
-              </a:ext>
-            </a:extLst>
-          </p:cNvPr>
-          <p:cNvSpPr>
-            <a:spLocks noGrp="1"/>
-          </p:cNvSpPr>
-          <p:nvPr>
-            <p:ph type="body" idx="1"/>
-          </p:nvPr>
-        </p:nvSpPr>
-        <p:spPr>
-          <a:xfrm>
-            <a:off x="747838" y="1386868"/>
-            <a:ext cx="10512000" cy="4680000"/>
-          </a:xfrm>
-        </p:spPr>
-        <p:txBody>
-          <a:bodyPr/>
-          <a:lstStyle/>
-          <a:p>
-            <a:r>
-              <a:rPr lang="en-US" dirty="0"/>
-              <a:t>Snowflake enables precise pruning of columns in micro-partitions at query run-time, including columns containing semi-structured data</a:t>
-            </a:r>
-          </a:p>
-        </p:txBody>
-      </p:sp>
-      <p:sp>
-        <p:nvSpPr>
-          <p:cNvPr id="6" name="Up-Down Arrow 5">
-            <a:extLst>
-              <a:ext uri="{FF2B5EF4-FFF2-40B4-BE49-F238E27FC236}">
-                <a16:creationId xmlns:a16="http://schemas.microsoft.com/office/drawing/2014/main" id="{0E3388D1-4515-AB4B-81C7-195CE2994400}"/>
-              </a:ext>
-            </a:extLst>
-          </p:cNvPr>
-          <p:cNvSpPr/>
-          <p:nvPr/>
-        </p:nvSpPr>
-        <p:spPr>
-          <a:xfrm>
-            <a:off x="1212214" y="3126390"/>
-            <a:ext cx="207818" cy="3060873"/>
-          </a:xfrm>
-          <a:prstGeom prst="upDownArrow">
-            <a:avLst/>
-          </a:prstGeom>
-        </p:spPr>
-        <p:style>
-          <a:lnRef idx="2">
-            <a:schemeClr val="accent1">
-              <a:shade val="50000"/>
-            </a:schemeClr>
-          </a:lnRef>
-          <a:fillRef idx="1">
-            <a:schemeClr val="accent1"/>
-          </a:fillRef>
-          <a:effectRef idx="0">
-            <a:schemeClr val="accent1"/>
-          </a:effectRef>
-          <a:fontRef idx="minor">
-            <a:schemeClr val="lt1"/>
-          </a:fontRef>
-        </p:style>
-        <p:txBody>
-          <a:bodyPr rtlCol="0" anchor="ctr"/>
-          <a:lstStyle/>
-          <a:p>
-            <a:pPr algn="ctr"/>
-            <a:endParaRPr lang="en-US"/>
-          </a:p>
-        </p:txBody>
-      </p:sp>
-      <p:sp>
-        <p:nvSpPr>
-          <p:cNvPr id="7" name="TextBox 6">
-            <a:extLst>
-              <a:ext uri="{FF2B5EF4-FFF2-40B4-BE49-F238E27FC236}">
-                <a16:creationId xmlns:a16="http://schemas.microsoft.com/office/drawing/2014/main" id="{A5AD76B1-1BBD-8241-9D86-B4356A999D7E}"/>
-              </a:ext>
-            </a:extLst>
-          </p:cNvPr>
-          <p:cNvSpPr txBox="1"/>
-          <p:nvPr/>
-        </p:nvSpPr>
-        <p:spPr>
-          <a:xfrm>
-            <a:off x="1845928" y="2875656"/>
-            <a:ext cx="9518072" cy="369332"/>
-          </a:xfrm>
-          <a:prstGeom prst="rect">
-            <a:avLst/>
-          </a:prstGeom>
-          <a:noFill/>
-        </p:spPr>
-        <p:txBody>
-          <a:bodyPr wrap="square" rtlCol="0">
-            <a:spAutoFit/>
-          </a:bodyPr>
-          <a:lstStyle/>
-          <a:p>
-            <a:r>
-              <a:rPr lang="en-US" dirty="0"/>
-              <a:t>Date 	Hour 	Action	    Action_Category         Feature	     Feature2	Feature3</a:t>
-            </a:r>
-          </a:p>
-        </p:txBody>
-      </p:sp>
-      <p:sp>
-        <p:nvSpPr>
-          <p:cNvPr id="8" name="TextBox 7">
-            <a:extLst>
-              <a:ext uri="{FF2B5EF4-FFF2-40B4-BE49-F238E27FC236}">
-                <a16:creationId xmlns:a16="http://schemas.microsoft.com/office/drawing/2014/main" id="{BA8E3326-3E98-FC45-A080-2EEDCE2DFFDE}"/>
-              </a:ext>
-            </a:extLst>
-          </p:cNvPr>
-          <p:cNvSpPr txBox="1"/>
-          <p:nvPr/>
-        </p:nvSpPr>
-        <p:spPr>
-          <a:xfrm>
-            <a:off x="79574" y="3498952"/>
-            <a:ext cx="1050927" cy="923330"/>
-          </a:xfrm>
-          <a:prstGeom prst="rect">
-            <a:avLst/>
-          </a:prstGeom>
-          <a:noFill/>
-        </p:spPr>
-        <p:txBody>
-          <a:bodyPr wrap="square" rtlCol="0">
-            <a:spAutoFit/>
-          </a:bodyPr>
-          <a:lstStyle/>
-          <a:p>
-            <a:pPr algn="ctr"/>
-            <a:r>
-              <a:rPr lang="en-US" dirty="0"/>
-              <a:t>1 year's worth of data</a:t>
-            </a:r>
-          </a:p>
-        </p:txBody>
-      </p:sp>
-      <p:sp>
-        <p:nvSpPr>
-          <p:cNvPr id="10" name="TextBox 9">
-            <a:extLst>
-              <a:ext uri="{FF2B5EF4-FFF2-40B4-BE49-F238E27FC236}">
-                <a16:creationId xmlns:a16="http://schemas.microsoft.com/office/drawing/2014/main" id="{2B76207B-04FF-FF44-AC89-AF55B3DCC09F}"/>
-              </a:ext>
-            </a:extLst>
-          </p:cNvPr>
-          <p:cNvSpPr txBox="1"/>
-          <p:nvPr/>
-        </p:nvSpPr>
-        <p:spPr>
-          <a:xfrm>
-            <a:off x="1350764" y="3244988"/>
-            <a:ext cx="1219254" cy="3108543"/>
-          </a:xfrm>
-          <a:prstGeom prst="rect">
-            <a:avLst/>
-          </a:prstGeom>
-          <a:noFill/>
-        </p:spPr>
-        <p:txBody>
-          <a:bodyPr wrap="square" rtlCol="0">
-            <a:spAutoFit/>
-          </a:bodyPr>
-          <a:lstStyle/>
-          <a:p>
-            <a:pPr algn="r"/>
-            <a:r>
-              <a:rPr lang="en-US" sz="1400" dirty="0"/>
-              <a:t>1/1/2019</a:t>
-            </a:r>
-          </a:p>
-          <a:p>
-            <a:pPr algn="r"/>
-            <a:r>
-              <a:rPr lang="en-US" sz="1400" dirty="0"/>
-              <a:t>1/2/2019</a:t>
-            </a:r>
-          </a:p>
-          <a:p>
-            <a:pPr algn="r"/>
-            <a:r>
-              <a:rPr lang="en-US" sz="1400" dirty="0"/>
-              <a:t>.</a:t>
-            </a:r>
-          </a:p>
-          <a:p>
-            <a:pPr algn="r"/>
-            <a:r>
-              <a:rPr lang="en-US" sz="1400" dirty="0"/>
-              <a:t>.</a:t>
-            </a:r>
-          </a:p>
-          <a:p>
-            <a:pPr algn="r"/>
-            <a:r>
-              <a:rPr lang="en-US" sz="1400" dirty="0"/>
-              <a:t>.</a:t>
-            </a:r>
-          </a:p>
-          <a:p>
-            <a:pPr algn="r"/>
-            <a:r>
-              <a:rPr lang="en-US" sz="1400" dirty="0"/>
-              <a:t>.</a:t>
-            </a:r>
-          </a:p>
-          <a:p>
-            <a:pPr algn="r"/>
-            <a:r>
-              <a:rPr lang="en-US" sz="1400" dirty="0"/>
-              <a:t>.</a:t>
-            </a:r>
-          </a:p>
-          <a:p>
-            <a:pPr algn="r"/>
-            <a:r>
-              <a:rPr lang="en-US" sz="1400" dirty="0"/>
-              <a:t>7/14/2019</a:t>
-            </a:r>
-          </a:p>
-          <a:p>
-            <a:pPr algn="r"/>
-            <a:r>
-              <a:rPr lang="en-US" sz="1400" dirty="0"/>
-              <a:t>.</a:t>
-            </a:r>
-          </a:p>
-          <a:p>
-            <a:pPr algn="r"/>
-            <a:r>
-              <a:rPr lang="en-US" sz="1400" dirty="0"/>
-              <a:t>.</a:t>
-            </a:r>
-          </a:p>
-          <a:p>
-            <a:pPr algn="r"/>
-            <a:r>
-              <a:rPr lang="en-US" sz="1400" dirty="0"/>
-              <a:t>.</a:t>
-            </a:r>
-          </a:p>
-          <a:p>
-            <a:pPr algn="r"/>
-            <a:r>
-              <a:rPr lang="en-US" sz="1400" dirty="0"/>
-              <a:t>.</a:t>
-            </a:r>
-          </a:p>
-          <a:p>
-            <a:pPr algn="r"/>
-            <a:r>
-              <a:rPr lang="en-US" sz="1400" dirty="0"/>
-              <a:t>12/31/2019</a:t>
-            </a:r>
-          </a:p>
-          <a:p>
-            <a:endParaRPr lang="en-US" sz="1400" dirty="0"/>
-          </a:p>
-        </p:txBody>
-      </p:sp>
-      <p:sp>
-        <p:nvSpPr>
-          <p:cNvPr id="11" name="TextBox 10">
-            <a:extLst>
-              <a:ext uri="{FF2B5EF4-FFF2-40B4-BE49-F238E27FC236}">
-                <a16:creationId xmlns:a16="http://schemas.microsoft.com/office/drawing/2014/main" id="{0A14B92F-34BE-E145-8FB7-66B5803F7E22}"/>
-              </a:ext>
-            </a:extLst>
-          </p:cNvPr>
-          <p:cNvSpPr txBox="1"/>
-          <p:nvPr/>
-        </p:nvSpPr>
-        <p:spPr>
-          <a:xfrm>
-            <a:off x="2247737" y="3225028"/>
-            <a:ext cx="1219254" cy="3108543"/>
-          </a:xfrm>
-          <a:prstGeom prst="rect">
-            <a:avLst/>
-          </a:prstGeom>
-          <a:noFill/>
-        </p:spPr>
-        <p:txBody>
-          <a:bodyPr wrap="square" rtlCol="0">
-            <a:spAutoFit/>
-          </a:bodyPr>
-          <a:lstStyle/>
-          <a:p>
-            <a:pPr algn="r"/>
-            <a:r>
-              <a:rPr lang="en-US" sz="1400" dirty="0"/>
-              <a:t>1pm</a:t>
-            </a:r>
-          </a:p>
-          <a:p>
-            <a:pPr algn="r"/>
-            <a:r>
-              <a:rPr lang="en-US" sz="1400" dirty="0"/>
-              <a:t>12am</a:t>
-            </a:r>
-          </a:p>
-          <a:p>
-            <a:pPr algn="r"/>
-            <a:r>
-              <a:rPr lang="en-US" sz="1400" dirty="0"/>
-              <a:t>.</a:t>
-            </a:r>
-          </a:p>
-          <a:p>
-            <a:pPr algn="r"/>
-            <a:r>
-              <a:rPr lang="en-US" sz="1400" dirty="0"/>
-              <a:t>.</a:t>
-            </a:r>
-          </a:p>
-          <a:p>
-            <a:pPr algn="r"/>
-            <a:r>
-              <a:rPr lang="en-US" sz="1400" dirty="0"/>
-              <a:t>.</a:t>
-            </a:r>
-          </a:p>
-          <a:p>
-            <a:pPr algn="r"/>
-            <a:r>
-              <a:rPr lang="en-US" sz="1400" dirty="0"/>
-              <a:t>.</a:t>
-            </a:r>
-          </a:p>
-          <a:p>
-            <a:pPr algn="r"/>
-            <a:r>
-              <a:rPr lang="en-US" sz="1400" dirty="0"/>
-              <a:t>.</a:t>
-            </a:r>
-          </a:p>
-          <a:p>
-            <a:pPr algn="r"/>
-            <a:r>
-              <a:rPr lang="en-US" sz="1400" dirty="0"/>
-              <a:t>4pm</a:t>
-            </a:r>
-          </a:p>
-          <a:p>
-            <a:pPr algn="r"/>
-            <a:r>
-              <a:rPr lang="en-US" sz="1400" dirty="0"/>
-              <a:t>.</a:t>
-            </a:r>
-          </a:p>
-          <a:p>
-            <a:pPr algn="r"/>
-            <a:r>
-              <a:rPr lang="en-US" sz="1400" dirty="0"/>
-              <a:t>.</a:t>
-            </a:r>
-          </a:p>
-          <a:p>
-            <a:pPr algn="r"/>
-            <a:r>
-              <a:rPr lang="en-US" sz="1400" dirty="0"/>
-              <a:t>.</a:t>
-            </a:r>
-          </a:p>
-          <a:p>
-            <a:pPr algn="r"/>
-            <a:r>
-              <a:rPr lang="en-US" sz="1400" dirty="0"/>
-              <a:t>.</a:t>
-            </a:r>
-          </a:p>
-          <a:p>
-            <a:pPr algn="r"/>
-            <a:r>
-              <a:rPr lang="en-US" sz="1400" dirty="0"/>
-              <a:t>3am</a:t>
-            </a:r>
-          </a:p>
-          <a:p>
-            <a:endParaRPr lang="en-US" sz="1400" dirty="0"/>
-          </a:p>
-        </p:txBody>
-      </p:sp>
-      <p:sp>
-        <p:nvSpPr>
-          <p:cNvPr id="12" name="TextBox 11">
-            <a:extLst>
-              <a:ext uri="{FF2B5EF4-FFF2-40B4-BE49-F238E27FC236}">
-                <a16:creationId xmlns:a16="http://schemas.microsoft.com/office/drawing/2014/main" id="{017BADD4-D7E5-2B4B-BF49-D80696C6DBD2}"/>
-              </a:ext>
-            </a:extLst>
-          </p:cNvPr>
-          <p:cNvSpPr txBox="1"/>
-          <p:nvPr/>
-        </p:nvSpPr>
-        <p:spPr>
-          <a:xfrm>
-            <a:off x="3253106" y="3225028"/>
-            <a:ext cx="1219254" cy="3108543"/>
-          </a:xfrm>
-          <a:prstGeom prst="rect">
-            <a:avLst/>
-          </a:prstGeom>
-          <a:noFill/>
-        </p:spPr>
-        <p:txBody>
-          <a:bodyPr wrap="square" rtlCol="0">
-            <a:spAutoFit/>
-          </a:bodyPr>
-          <a:lstStyle/>
-          <a:p>
-            <a:pPr algn="r"/>
-            <a:r>
-              <a:rPr lang="en-US" sz="1400" dirty="0"/>
-              <a:t>xxxxx</a:t>
-            </a:r>
-          </a:p>
-          <a:p>
-            <a:pPr algn="r"/>
-            <a:r>
-              <a:rPr lang="en-US" sz="1400" dirty="0"/>
-              <a:t>yyyyy</a:t>
-            </a:r>
-          </a:p>
-          <a:p>
-            <a:pPr algn="r"/>
-            <a:r>
-              <a:rPr lang="en-US" sz="1400" dirty="0"/>
-              <a:t>.</a:t>
-            </a:r>
-          </a:p>
-          <a:p>
-            <a:pPr algn="r"/>
-            <a:r>
-              <a:rPr lang="en-US" sz="1400" dirty="0"/>
-              <a:t>.</a:t>
-            </a:r>
-          </a:p>
-          <a:p>
-            <a:pPr algn="r"/>
-            <a:r>
-              <a:rPr lang="en-US" sz="1400" dirty="0"/>
-              <a:t>.</a:t>
-            </a:r>
-          </a:p>
-          <a:p>
-            <a:pPr algn="r"/>
-            <a:r>
-              <a:rPr lang="en-US" sz="1400" dirty="0"/>
-              <a:t>.</a:t>
-            </a:r>
-          </a:p>
-          <a:p>
-            <a:pPr algn="r"/>
-            <a:r>
-              <a:rPr lang="en-US" sz="1400" dirty="0"/>
-              <a:t>.</a:t>
-            </a:r>
-          </a:p>
-          <a:p>
-            <a:pPr algn="r"/>
-            <a:r>
-              <a:rPr lang="en-US" sz="1400" dirty="0"/>
-              <a:t>zzzzz</a:t>
-            </a:r>
-          </a:p>
-          <a:p>
-            <a:pPr algn="r"/>
-            <a:r>
-              <a:rPr lang="en-US" sz="1400" dirty="0"/>
-              <a:t>.</a:t>
-            </a:r>
-          </a:p>
-          <a:p>
-            <a:pPr algn="r"/>
-            <a:r>
-              <a:rPr lang="en-US" sz="1400" dirty="0"/>
-              <a:t>.</a:t>
-            </a:r>
-          </a:p>
-          <a:p>
-            <a:pPr algn="r"/>
-            <a:r>
-              <a:rPr lang="en-US" sz="1400" dirty="0"/>
-              <a:t>.</a:t>
-            </a:r>
-          </a:p>
-          <a:p>
-            <a:pPr algn="r"/>
-            <a:r>
-              <a:rPr lang="en-US" sz="1400" dirty="0"/>
-              <a:t>.</a:t>
-            </a:r>
-          </a:p>
-          <a:p>
-            <a:pPr algn="r"/>
-            <a:r>
-              <a:rPr lang="en-US" sz="1400" dirty="0"/>
-              <a:t>www</a:t>
-            </a:r>
-          </a:p>
-          <a:p>
-            <a:endParaRPr lang="en-US" sz="1400" dirty="0"/>
-          </a:p>
-        </p:txBody>
-      </p:sp>
-      <p:sp>
-        <p:nvSpPr>
-          <p:cNvPr id="13" name="TextBox 12">
-            <a:extLst>
-              <a:ext uri="{FF2B5EF4-FFF2-40B4-BE49-F238E27FC236}">
-                <a16:creationId xmlns:a16="http://schemas.microsoft.com/office/drawing/2014/main" id="{FB86DFB9-E3EF-5846-8BAF-0D9174829DAE}"/>
-              </a:ext>
-            </a:extLst>
-          </p:cNvPr>
-          <p:cNvSpPr txBox="1"/>
-          <p:nvPr/>
-        </p:nvSpPr>
-        <p:spPr>
-          <a:xfrm>
-            <a:off x="4784584" y="3236161"/>
-            <a:ext cx="1219254" cy="3108543"/>
-          </a:xfrm>
-          <a:prstGeom prst="rect">
-            <a:avLst/>
-          </a:prstGeom>
-          <a:noFill/>
-        </p:spPr>
-        <p:txBody>
-          <a:bodyPr wrap="square" rtlCol="0">
-            <a:spAutoFit/>
-          </a:bodyPr>
-          <a:lstStyle/>
-          <a:p>
-            <a:pPr algn="r"/>
-            <a:r>
-              <a:rPr lang="en-US" sz="1400" dirty="0"/>
-              <a:t>xxxxx</a:t>
-            </a:r>
-          </a:p>
-          <a:p>
-            <a:pPr algn="r"/>
-            <a:r>
-              <a:rPr lang="en-US" sz="1400" dirty="0"/>
-              <a:t>yyyyy</a:t>
-            </a:r>
-          </a:p>
-          <a:p>
-            <a:pPr algn="r"/>
-            <a:r>
-              <a:rPr lang="en-US" sz="1400" dirty="0"/>
-              <a:t>.</a:t>
-            </a:r>
-          </a:p>
-          <a:p>
-            <a:pPr algn="r"/>
-            <a:r>
-              <a:rPr lang="en-US" sz="1400" dirty="0"/>
-              <a:t>.</a:t>
-            </a:r>
-          </a:p>
-          <a:p>
-            <a:pPr algn="r"/>
-            <a:r>
-              <a:rPr lang="en-US" sz="1400" dirty="0"/>
-              <a:t>.</a:t>
-            </a:r>
-          </a:p>
-          <a:p>
-            <a:pPr algn="r"/>
-            <a:r>
-              <a:rPr lang="en-US" sz="1400" dirty="0"/>
-              <a:t>.</a:t>
-            </a:r>
-          </a:p>
-          <a:p>
-            <a:pPr algn="r"/>
-            <a:r>
-              <a:rPr lang="en-US" sz="1400" dirty="0"/>
-              <a:t>.</a:t>
-            </a:r>
-          </a:p>
-          <a:p>
-            <a:pPr algn="r"/>
-            <a:r>
-              <a:rPr lang="en-US" sz="1400" dirty="0"/>
-              <a:t>zzzzz</a:t>
-            </a:r>
-          </a:p>
-          <a:p>
-            <a:pPr algn="r"/>
-            <a:r>
-              <a:rPr lang="en-US" sz="1400" dirty="0"/>
-              <a:t>.</a:t>
-            </a:r>
-          </a:p>
-          <a:p>
-            <a:pPr algn="r"/>
-            <a:r>
-              <a:rPr lang="en-US" sz="1400" dirty="0"/>
-              <a:t>.</a:t>
-            </a:r>
-          </a:p>
-          <a:p>
-            <a:pPr algn="r"/>
-            <a:r>
-              <a:rPr lang="en-US" sz="1400" dirty="0"/>
-              <a:t>.</a:t>
-            </a:r>
-          </a:p>
-          <a:p>
-            <a:pPr algn="r"/>
-            <a:r>
-              <a:rPr lang="en-US" sz="1400" dirty="0"/>
-              <a:t>.</a:t>
-            </a:r>
-          </a:p>
-          <a:p>
-            <a:pPr algn="r"/>
-            <a:r>
-              <a:rPr lang="en-US" sz="1400" dirty="0"/>
-              <a:t>www</a:t>
-            </a:r>
-          </a:p>
-          <a:p>
-            <a:endParaRPr lang="en-US" sz="1400" dirty="0"/>
-          </a:p>
-        </p:txBody>
-      </p:sp>
-      <p:sp>
-        <p:nvSpPr>
-          <p:cNvPr id="14" name="TextBox 13">
-            <a:extLst>
-              <a:ext uri="{FF2B5EF4-FFF2-40B4-BE49-F238E27FC236}">
-                <a16:creationId xmlns:a16="http://schemas.microsoft.com/office/drawing/2014/main" id="{2A370076-CFF4-2B43-9C5A-77CB10A805D3}"/>
-              </a:ext>
-            </a:extLst>
-          </p:cNvPr>
-          <p:cNvSpPr txBox="1"/>
-          <p:nvPr/>
-        </p:nvSpPr>
-        <p:spPr>
-          <a:xfrm>
-            <a:off x="6686926" y="3261506"/>
-            <a:ext cx="1219254" cy="3108543"/>
-          </a:xfrm>
-          <a:prstGeom prst="rect">
-            <a:avLst/>
-          </a:prstGeom>
-          <a:noFill/>
-        </p:spPr>
-        <p:txBody>
-          <a:bodyPr wrap="square" rtlCol="0">
-            <a:spAutoFit/>
-          </a:bodyPr>
-          <a:lstStyle/>
-          <a:p>
-            <a:pPr algn="r"/>
-            <a:r>
-              <a:rPr lang="en-US" sz="1400" dirty="0"/>
-              <a:t>xxxxx</a:t>
-            </a:r>
-          </a:p>
-          <a:p>
-            <a:pPr algn="r"/>
-            <a:r>
-              <a:rPr lang="en-US" sz="1400" dirty="0"/>
-              <a:t>yyyyy</a:t>
-            </a:r>
-          </a:p>
-          <a:p>
-            <a:pPr algn="r"/>
-            <a:r>
-              <a:rPr lang="en-US" sz="1400" dirty="0"/>
-              <a:t>.</a:t>
-            </a:r>
-          </a:p>
-          <a:p>
-            <a:pPr algn="r"/>
-            <a:r>
-              <a:rPr lang="en-US" sz="1400" dirty="0"/>
-              <a:t>.</a:t>
-            </a:r>
-          </a:p>
-          <a:p>
-            <a:pPr algn="r"/>
-            <a:r>
-              <a:rPr lang="en-US" sz="1400" dirty="0"/>
-              <a:t>.</a:t>
-            </a:r>
-          </a:p>
-          <a:p>
-            <a:pPr algn="r"/>
-            <a:r>
-              <a:rPr lang="en-US" sz="1400" dirty="0"/>
-              <a:t>.</a:t>
-            </a:r>
-          </a:p>
-          <a:p>
-            <a:pPr algn="r"/>
-            <a:r>
-              <a:rPr lang="en-US" sz="1400" dirty="0"/>
-              <a:t>.</a:t>
-            </a:r>
-          </a:p>
-          <a:p>
-            <a:pPr algn="r"/>
-            <a:r>
-              <a:rPr lang="en-US" sz="1400" dirty="0"/>
-              <a:t>zzzzz</a:t>
-            </a:r>
-          </a:p>
-          <a:p>
-            <a:pPr algn="r"/>
-            <a:r>
-              <a:rPr lang="en-US" sz="1400" dirty="0"/>
-              <a:t>.</a:t>
-            </a:r>
-          </a:p>
-          <a:p>
-            <a:pPr algn="r"/>
-            <a:r>
-              <a:rPr lang="en-US" sz="1400" dirty="0"/>
-              <a:t>.</a:t>
-            </a:r>
-          </a:p>
-          <a:p>
-            <a:pPr algn="r"/>
-            <a:r>
-              <a:rPr lang="en-US" sz="1400" dirty="0"/>
-              <a:t>.</a:t>
-            </a:r>
-          </a:p>
-          <a:p>
-            <a:pPr algn="r"/>
-            <a:r>
-              <a:rPr lang="en-US" sz="1400" dirty="0"/>
-              <a:t>.</a:t>
-            </a:r>
-          </a:p>
-          <a:p>
-            <a:pPr algn="r"/>
-            <a:r>
-              <a:rPr lang="en-US" sz="1400" dirty="0"/>
-              <a:t>www</a:t>
-            </a:r>
-          </a:p>
-          <a:p>
-            <a:endParaRPr lang="en-US" sz="1400" dirty="0"/>
-          </a:p>
-        </p:txBody>
-      </p:sp>
-      <p:sp>
-        <p:nvSpPr>
-          <p:cNvPr id="15" name="TextBox 14">
-            <a:extLst>
-              <a:ext uri="{FF2B5EF4-FFF2-40B4-BE49-F238E27FC236}">
-                <a16:creationId xmlns:a16="http://schemas.microsoft.com/office/drawing/2014/main" id="{680CDA20-AC18-4C41-8C27-4BFA3412A04E}"/>
-              </a:ext>
-            </a:extLst>
-          </p:cNvPr>
-          <p:cNvSpPr txBox="1"/>
-          <p:nvPr/>
-        </p:nvSpPr>
-        <p:spPr>
-          <a:xfrm>
-            <a:off x="8156701" y="3225028"/>
-            <a:ext cx="1219254" cy="3108543"/>
-          </a:xfrm>
-          <a:prstGeom prst="rect">
-            <a:avLst/>
-          </a:prstGeom>
-          <a:noFill/>
-        </p:spPr>
-        <p:txBody>
-          <a:bodyPr wrap="square" rtlCol="0">
-            <a:spAutoFit/>
-          </a:bodyPr>
-          <a:lstStyle/>
-          <a:p>
-            <a:pPr algn="r"/>
-            <a:r>
-              <a:rPr lang="en-US" sz="1400" dirty="0"/>
-              <a:t>xxxxx</a:t>
-            </a:r>
-          </a:p>
-          <a:p>
-            <a:pPr algn="r"/>
-            <a:r>
-              <a:rPr lang="en-US" sz="1400" dirty="0"/>
-              <a:t>yyyyy</a:t>
-            </a:r>
-          </a:p>
-          <a:p>
-            <a:pPr algn="r"/>
-            <a:r>
-              <a:rPr lang="en-US" sz="1400" dirty="0"/>
-              <a:t>.</a:t>
-            </a:r>
-          </a:p>
-          <a:p>
-            <a:pPr algn="r"/>
-            <a:r>
-              <a:rPr lang="en-US" sz="1400" dirty="0"/>
-              <a:t>.</a:t>
-            </a:r>
-          </a:p>
-          <a:p>
-            <a:pPr algn="r"/>
-            <a:r>
-              <a:rPr lang="en-US" sz="1400" dirty="0"/>
-              <a:t>.</a:t>
-            </a:r>
-          </a:p>
-          <a:p>
-            <a:pPr algn="r"/>
-            <a:r>
-              <a:rPr lang="en-US" sz="1400" dirty="0"/>
-              <a:t>.</a:t>
-            </a:r>
-          </a:p>
-          <a:p>
-            <a:pPr algn="r"/>
-            <a:r>
-              <a:rPr lang="en-US" sz="1400" dirty="0"/>
-              <a:t>.</a:t>
-            </a:r>
-          </a:p>
-          <a:p>
-            <a:pPr algn="r"/>
-            <a:r>
-              <a:rPr lang="en-US" sz="1400" dirty="0"/>
-              <a:t>zzzzz</a:t>
-            </a:r>
-          </a:p>
-          <a:p>
-            <a:pPr algn="r"/>
-            <a:r>
-              <a:rPr lang="en-US" sz="1400" dirty="0"/>
-              <a:t>.</a:t>
-            </a:r>
-          </a:p>
-          <a:p>
-            <a:pPr algn="r"/>
-            <a:r>
-              <a:rPr lang="en-US" sz="1400" dirty="0"/>
-              <a:t>.</a:t>
-            </a:r>
-          </a:p>
-          <a:p>
-            <a:pPr algn="r"/>
-            <a:r>
-              <a:rPr lang="en-US" sz="1400" dirty="0"/>
-              <a:t>.</a:t>
-            </a:r>
-          </a:p>
-          <a:p>
-            <a:pPr algn="r"/>
-            <a:r>
-              <a:rPr lang="en-US" sz="1400" dirty="0"/>
-              <a:t>.</a:t>
-            </a:r>
-          </a:p>
-          <a:p>
-            <a:pPr algn="r"/>
-            <a:r>
-              <a:rPr lang="en-US" sz="1400" dirty="0"/>
-              <a:t>www</a:t>
-            </a:r>
-          </a:p>
-          <a:p>
-            <a:endParaRPr lang="en-US" sz="1400" dirty="0"/>
-          </a:p>
-        </p:txBody>
-      </p:sp>
-      <p:sp>
-        <p:nvSpPr>
-          <p:cNvPr id="16" name="TextBox 15">
-            <a:extLst>
-              <a:ext uri="{FF2B5EF4-FFF2-40B4-BE49-F238E27FC236}">
-                <a16:creationId xmlns:a16="http://schemas.microsoft.com/office/drawing/2014/main" id="{6E8D7745-A94A-1041-8B77-35A3276E50F8}"/>
-              </a:ext>
-            </a:extLst>
-          </p:cNvPr>
-          <p:cNvSpPr txBox="1"/>
-          <p:nvPr/>
-        </p:nvSpPr>
-        <p:spPr>
-          <a:xfrm>
-            <a:off x="9784256" y="3194297"/>
-            <a:ext cx="1219254" cy="3108543"/>
-          </a:xfrm>
-          <a:prstGeom prst="rect">
-            <a:avLst/>
-          </a:prstGeom>
-          <a:noFill/>
-        </p:spPr>
-        <p:txBody>
-          <a:bodyPr wrap="square" rtlCol="0">
-            <a:spAutoFit/>
-          </a:bodyPr>
-          <a:lstStyle/>
-          <a:p>
-            <a:pPr algn="r"/>
-            <a:r>
-              <a:rPr lang="en-US" sz="1400" dirty="0"/>
-              <a:t>xxxxx</a:t>
-            </a:r>
-          </a:p>
-          <a:p>
-            <a:pPr algn="r"/>
-            <a:r>
-              <a:rPr lang="en-US" sz="1400" dirty="0"/>
-              <a:t>yyyyy</a:t>
-            </a:r>
-          </a:p>
-          <a:p>
-            <a:pPr algn="r"/>
-            <a:r>
-              <a:rPr lang="en-US" sz="1400" dirty="0"/>
-              <a:t>.</a:t>
-            </a:r>
-          </a:p>
-          <a:p>
-            <a:pPr algn="r"/>
-            <a:r>
-              <a:rPr lang="en-US" sz="1400" dirty="0"/>
-              <a:t>.</a:t>
-            </a:r>
-          </a:p>
-          <a:p>
-            <a:pPr algn="r"/>
-            <a:r>
-              <a:rPr lang="en-US" sz="1400" dirty="0"/>
-              <a:t>.</a:t>
-            </a:r>
-          </a:p>
-          <a:p>
-            <a:pPr algn="r"/>
-            <a:r>
-              <a:rPr lang="en-US" sz="1400" dirty="0"/>
-              <a:t>.</a:t>
-            </a:r>
-          </a:p>
-          <a:p>
-            <a:pPr algn="r"/>
-            <a:r>
-              <a:rPr lang="en-US" sz="1400" dirty="0"/>
-              <a:t>.</a:t>
-            </a:r>
-          </a:p>
-          <a:p>
-            <a:pPr algn="r"/>
-            <a:r>
-              <a:rPr lang="en-US" sz="1400" dirty="0"/>
-              <a:t>zzzzz</a:t>
-            </a:r>
-          </a:p>
-          <a:p>
-            <a:pPr algn="r"/>
-            <a:r>
-              <a:rPr lang="en-US" sz="1400" dirty="0"/>
-              <a:t>.</a:t>
-            </a:r>
-          </a:p>
-          <a:p>
-            <a:pPr algn="r"/>
-            <a:r>
-              <a:rPr lang="en-US" sz="1400" dirty="0"/>
-              <a:t>.</a:t>
-            </a:r>
-          </a:p>
-          <a:p>
-            <a:pPr algn="r"/>
-            <a:r>
-              <a:rPr lang="en-US" sz="1400" dirty="0"/>
-              <a:t>.</a:t>
-            </a:r>
-          </a:p>
-          <a:p>
-            <a:pPr algn="r"/>
-            <a:r>
-              <a:rPr lang="en-US" sz="1400" dirty="0"/>
-              <a:t>.</a:t>
-            </a:r>
-          </a:p>
-          <a:p>
-            <a:pPr algn="r"/>
-            <a:r>
-              <a:rPr lang="en-US" sz="1400" dirty="0"/>
-              <a:t>www</a:t>
-            </a:r>
-          </a:p>
-          <a:p>
-            <a:endParaRPr lang="en-US" sz="1400" dirty="0"/>
-          </a:p>
-        </p:txBody>
-      </p:sp>
-      <p:sp>
-        <p:nvSpPr>
-          <p:cNvPr id="17" name="Rectangle 16">
-            <a:extLst>
-              <a:ext uri="{FF2B5EF4-FFF2-40B4-BE49-F238E27FC236}">
-                <a16:creationId xmlns:a16="http://schemas.microsoft.com/office/drawing/2014/main" id="{7B2A60A1-B999-2F45-B517-F13014CAA018}"/>
-              </a:ext>
-            </a:extLst>
-          </p:cNvPr>
-          <p:cNvSpPr/>
-          <p:nvPr/>
-        </p:nvSpPr>
-        <p:spPr>
-          <a:xfrm>
-            <a:off x="2691403" y="2715485"/>
-            <a:ext cx="886428" cy="3471778"/>
-          </a:xfrm>
-          <a:prstGeom prst="rect">
-            <a:avLst/>
-          </a:prstGeom>
-          <a:noFill/>
-          <a:ln>
-            <a:solidFill>
-              <a:srgbClr val="92D050"/>
-            </a:solidFill>
-          </a:ln>
-        </p:spPr>
-        <p:style>
-          <a:lnRef idx="2">
-            <a:schemeClr val="accent1">
-              <a:shade val="50000"/>
-            </a:schemeClr>
-          </a:lnRef>
-          <a:fillRef idx="1">
-            <a:schemeClr val="accent1"/>
-          </a:fillRef>
-          <a:effectRef idx="0">
-            <a:schemeClr val="accent1"/>
-          </a:effectRef>
-          <a:fontRef idx="minor">
-            <a:schemeClr val="lt1"/>
-          </a:fontRef>
-        </p:style>
-        <p:txBody>
-          <a:bodyPr rtlCol="0" anchor="ctr"/>
-          <a:lstStyle/>
-          <a:p>
-            <a:pPr algn="ctr"/>
-            <a:endParaRPr lang="en-US"/>
-          </a:p>
-        </p:txBody>
-      </p:sp>
-      <p:sp>
-        <p:nvSpPr>
-          <p:cNvPr id="18" name="Rectangle 17">
-            <a:extLst>
-              <a:ext uri="{FF2B5EF4-FFF2-40B4-BE49-F238E27FC236}">
-                <a16:creationId xmlns:a16="http://schemas.microsoft.com/office/drawing/2014/main" id="{9767D559-68F6-6840-8E8E-7688993741A2}"/>
-              </a:ext>
-            </a:extLst>
-          </p:cNvPr>
-          <p:cNvSpPr/>
-          <p:nvPr/>
-        </p:nvSpPr>
-        <p:spPr>
-          <a:xfrm>
-            <a:off x="1475453" y="3498952"/>
-            <a:ext cx="9888548" cy="227916"/>
-          </a:xfrm>
-          <a:prstGeom prst="rect">
-            <a:avLst/>
-          </a:prstGeom>
-          <a:noFill/>
-          <a:ln>
-            <a:solidFill>
-              <a:srgbClr val="92D050"/>
-            </a:solidFill>
-          </a:ln>
-        </p:spPr>
-        <p:style>
-          <a:lnRef idx="2">
-            <a:schemeClr val="accent1">
-              <a:shade val="50000"/>
-            </a:schemeClr>
-          </a:lnRef>
-          <a:fillRef idx="1">
-            <a:schemeClr val="accent1"/>
-          </a:fillRef>
-          <a:effectRef idx="0">
-            <a:schemeClr val="accent1"/>
-          </a:effectRef>
-          <a:fontRef idx="minor">
-            <a:schemeClr val="lt1"/>
-          </a:fontRef>
-        </p:style>
-        <p:txBody>
-          <a:bodyPr rtlCol="0" anchor="ctr"/>
-          <a:lstStyle/>
-          <a:p>
-            <a:pPr algn="ctr"/>
-            <a:endParaRPr lang="en-US"/>
-          </a:p>
-        </p:txBody>
-      </p:sp>
-    </p:spTree>
-    <p:extLst>
-      <p:ext uri="{BB962C8B-B14F-4D97-AF65-F5344CB8AC3E}">
-        <p14:creationId xmlns:p14="http://schemas.microsoft.com/office/powerpoint/2010/main" val="3389296006"/>
       </p:ext>
     </p:extLst>
   </p:cSld>

</xml_diff>